<commit_message>
String Manipulation lecture update
</commit_message>
<xml_diff>
--- a/slides/On-Campus/06_03_StringManipulation.pptx
+++ b/slides/On-Campus/06_03_StringManipulation.pptx
@@ -149,568 +149,53 @@
 <pc:chgInfo xmlns:a="http://schemas.openxmlformats.org/drawingml/2006/main" xmlns:r="http://schemas.openxmlformats.org/officeDocument/2006/relationships" xmlns:ac="http://schemas.microsoft.com/office/drawing/2013/main/command" xmlns:pc="http://schemas.microsoft.com/office/powerpoint/2013/main/command">
   <pc:docChgLst>
     <pc:chgData name="Marcia Moraes" userId="c9c67e8a-58e2-4733-9a1c-5d44fec4775b" providerId="ADAL" clId="{CC8A3895-9B1D-4E8D-B30E-808FECC1E1B4}"/>
-    <pc:docChg chg="undo custSel addSld delSld modSld modMainMaster">
-      <pc:chgData name="Marcia Moraes" userId="c9c67e8a-58e2-4733-9a1c-5d44fec4775b" providerId="ADAL" clId="{CC8A3895-9B1D-4E8D-B30E-808FECC1E1B4}" dt="2023-02-23T23:29:57.431" v="726" actId="20577"/>
+  </pc:docChgLst>
+  <pc:docChgLst>
+    <pc:chgData name="Marcia Moraes" userId="c9c67e8a-58e2-4733-9a1c-5d44fec4775b" providerId="ADAL" clId="{F9CDF985-13F2-499A-8A55-943F22618C3C}"/>
+    <pc:docChg chg="custSel modSld">
+      <pc:chgData name="Marcia Moraes" userId="c9c67e8a-58e2-4733-9a1c-5d44fec4775b" providerId="ADAL" clId="{F9CDF985-13F2-499A-8A55-943F22618C3C}" dt="2023-09-14T13:59:35.254" v="173" actId="20577"/>
       <pc:docMkLst>
         <pc:docMk/>
       </pc:docMkLst>
-      <pc:sldChg chg="delSp delAnim">
-        <pc:chgData name="Marcia Moraes" userId="c9c67e8a-58e2-4733-9a1c-5d44fec4775b" providerId="ADAL" clId="{CC8A3895-9B1D-4E8D-B30E-808FECC1E1B4}" dt="2023-02-23T15:57:25.047" v="4" actId="478"/>
-        <pc:sldMkLst>
-          <pc:docMk/>
-          <pc:sldMk cId="3969704182" sldId="261"/>
-        </pc:sldMkLst>
-        <pc:spChg chg="del">
-          <ac:chgData name="Marcia Moraes" userId="c9c67e8a-58e2-4733-9a1c-5d44fec4775b" providerId="ADAL" clId="{CC8A3895-9B1D-4E8D-B30E-808FECC1E1B4}" dt="2023-02-23T15:57:25.047" v="4" actId="478"/>
-          <ac:spMkLst>
-            <pc:docMk/>
-            <pc:sldMk cId="3969704182" sldId="261"/>
-            <ac:spMk id="31" creationId="{E51876F8-27E9-504A-AA5A-864FCBDC187B}"/>
-          </ac:spMkLst>
-        </pc:spChg>
-      </pc:sldChg>
-      <pc:sldChg chg="addSp modSp modAnim">
-        <pc:chgData name="Marcia Moraes" userId="c9c67e8a-58e2-4733-9a1c-5d44fec4775b" providerId="ADAL" clId="{CC8A3895-9B1D-4E8D-B30E-808FECC1E1B4}" dt="2023-02-23T23:25:46.977" v="659" actId="1076"/>
-        <pc:sldMkLst>
-          <pc:docMk/>
-          <pc:sldMk cId="517950337" sldId="264"/>
-        </pc:sldMkLst>
-        <pc:spChg chg="mod">
-          <ac:chgData name="Marcia Moraes" userId="c9c67e8a-58e2-4733-9a1c-5d44fec4775b" providerId="ADAL" clId="{CC8A3895-9B1D-4E8D-B30E-808FECC1E1B4}" dt="2023-02-23T23:15:42.693" v="636" actId="6549"/>
-          <ac:spMkLst>
-            <pc:docMk/>
-            <pc:sldMk cId="517950337" sldId="264"/>
-            <ac:spMk id="5" creationId="{A94513F3-5A4B-4FA4-A070-ED9CE1FAC993}"/>
-          </ac:spMkLst>
-        </pc:spChg>
-        <pc:spChg chg="add mod">
-          <ac:chgData name="Marcia Moraes" userId="c9c67e8a-58e2-4733-9a1c-5d44fec4775b" providerId="ADAL" clId="{CC8A3895-9B1D-4E8D-B30E-808FECC1E1B4}" dt="2023-02-23T23:25:46.977" v="659" actId="1076"/>
-          <ac:spMkLst>
-            <pc:docMk/>
-            <pc:sldMk cId="517950337" sldId="264"/>
-            <ac:spMk id="6" creationId="{0B8F73F2-90D7-4F9A-A677-2052C2FA1D04}"/>
-          </ac:spMkLst>
-        </pc:spChg>
-      </pc:sldChg>
-      <pc:sldChg chg="modSp del">
-        <pc:chgData name="Marcia Moraes" userId="c9c67e8a-58e2-4733-9a1c-5d44fec4775b" providerId="ADAL" clId="{CC8A3895-9B1D-4E8D-B30E-808FECC1E1B4}" dt="2023-02-23T23:19:15.733" v="657" actId="2696"/>
-        <pc:sldMkLst>
-          <pc:docMk/>
-          <pc:sldMk cId="1248528315" sldId="265"/>
-        </pc:sldMkLst>
-        <pc:spChg chg="mod">
-          <ac:chgData name="Marcia Moraes" userId="c9c67e8a-58e2-4733-9a1c-5d44fec4775b" providerId="ADAL" clId="{CC8A3895-9B1D-4E8D-B30E-808FECC1E1B4}" dt="2023-02-23T15:54:40.688" v="1" actId="1076"/>
-          <ac:spMkLst>
-            <pc:docMk/>
-            <pc:sldMk cId="1248528315" sldId="265"/>
-            <ac:spMk id="3" creationId="{69C8F260-181B-4E56-A55E-0C248418EB45}"/>
-          </ac:spMkLst>
-        </pc:spChg>
-        <pc:spChg chg="mod">
-          <ac:chgData name="Marcia Moraes" userId="c9c67e8a-58e2-4733-9a1c-5d44fec4775b" providerId="ADAL" clId="{CC8A3895-9B1D-4E8D-B30E-808FECC1E1B4}" dt="2023-02-23T23:18:26.534" v="656" actId="6549"/>
-          <ac:spMkLst>
-            <pc:docMk/>
-            <pc:sldMk cId="1248528315" sldId="265"/>
-            <ac:spMk id="8" creationId="{B05AEA2E-2225-4D60-986E-0D9A179824B3}"/>
-          </ac:spMkLst>
-        </pc:spChg>
-      </pc:sldChg>
-      <pc:sldChg chg="del">
-        <pc:chgData name="Marcia Moraes" userId="c9c67e8a-58e2-4733-9a1c-5d44fec4775b" providerId="ADAL" clId="{CC8A3895-9B1D-4E8D-B30E-808FECC1E1B4}" dt="2023-02-23T15:57:28.880" v="5" actId="2696"/>
-        <pc:sldMkLst>
-          <pc:docMk/>
-          <pc:sldMk cId="2531927317" sldId="266"/>
-        </pc:sldMkLst>
-      </pc:sldChg>
-      <pc:sldChg chg="modSp">
-        <pc:chgData name="Marcia Moraes" userId="c9c67e8a-58e2-4733-9a1c-5d44fec4775b" providerId="ADAL" clId="{CC8A3895-9B1D-4E8D-B30E-808FECC1E1B4}" dt="2023-02-23T20:56:52.876" v="212" actId="20577"/>
-        <pc:sldMkLst>
-          <pc:docMk/>
-          <pc:sldMk cId="1499344891" sldId="267"/>
-        </pc:sldMkLst>
-        <pc:spChg chg="mod">
-          <ac:chgData name="Marcia Moraes" userId="c9c67e8a-58e2-4733-9a1c-5d44fec4775b" providerId="ADAL" clId="{CC8A3895-9B1D-4E8D-B30E-808FECC1E1B4}" dt="2023-02-23T20:56:52.876" v="212" actId="20577"/>
-          <ac:spMkLst>
-            <pc:docMk/>
-            <pc:sldMk cId="1499344891" sldId="267"/>
-            <ac:spMk id="3" creationId="{178B3EEE-0975-4700-AA54-BEF9ABDC29D1}"/>
-          </ac:spMkLst>
-        </pc:spChg>
-      </pc:sldChg>
-      <pc:sldChg chg="addSp modSp add modAnim">
-        <pc:chgData name="Marcia Moraes" userId="c9c67e8a-58e2-4733-9a1c-5d44fec4775b" providerId="ADAL" clId="{CC8A3895-9B1D-4E8D-B30E-808FECC1E1B4}" dt="2023-02-23T22:58:48.906" v="523" actId="20577"/>
-        <pc:sldMkLst>
-          <pc:docMk/>
-          <pc:sldMk cId="564003476" sldId="274"/>
-        </pc:sldMkLst>
-        <pc:spChg chg="mod">
-          <ac:chgData name="Marcia Moraes" userId="c9c67e8a-58e2-4733-9a1c-5d44fec4775b" providerId="ADAL" clId="{CC8A3895-9B1D-4E8D-B30E-808FECC1E1B4}" dt="2023-02-23T21:00:04.633" v="240" actId="20577"/>
-          <ac:spMkLst>
-            <pc:docMk/>
-            <pc:sldMk cId="564003476" sldId="274"/>
-            <ac:spMk id="2" creationId="{1060DE03-5D81-4A93-A5A7-5046D4901476}"/>
-          </ac:spMkLst>
-        </pc:spChg>
-        <pc:spChg chg="mod">
-          <ac:chgData name="Marcia Moraes" userId="c9c67e8a-58e2-4733-9a1c-5d44fec4775b" providerId="ADAL" clId="{CC8A3895-9B1D-4E8D-B30E-808FECC1E1B4}" dt="2023-02-23T22:56:28.903" v="361" actId="14100"/>
-          <ac:spMkLst>
-            <pc:docMk/>
-            <pc:sldMk cId="564003476" sldId="274"/>
-            <ac:spMk id="3" creationId="{EDF47717-F39C-4921-98CF-656005778F87}"/>
-          </ac:spMkLst>
-        </pc:spChg>
-        <pc:spChg chg="add mod">
-          <ac:chgData name="Marcia Moraes" userId="c9c67e8a-58e2-4733-9a1c-5d44fec4775b" providerId="ADAL" clId="{CC8A3895-9B1D-4E8D-B30E-808FECC1E1B4}" dt="2023-02-23T22:57:04.423" v="366" actId="1076"/>
-          <ac:spMkLst>
-            <pc:docMk/>
-            <pc:sldMk cId="564003476" sldId="274"/>
-            <ac:spMk id="5" creationId="{4AF8DBB4-337A-4276-964E-C6D3914E6C78}"/>
-          </ac:spMkLst>
-        </pc:spChg>
-        <pc:spChg chg="add mod">
-          <ac:chgData name="Marcia Moraes" userId="c9c67e8a-58e2-4733-9a1c-5d44fec4775b" providerId="ADAL" clId="{CC8A3895-9B1D-4E8D-B30E-808FECC1E1B4}" dt="2023-02-23T22:57:36.141" v="467" actId="14100"/>
-          <ac:spMkLst>
-            <pc:docMk/>
-            <pc:sldMk cId="564003476" sldId="274"/>
-            <ac:spMk id="6" creationId="{A6B1865B-C341-460C-972B-704AB84FEDC2}"/>
-          </ac:spMkLst>
-        </pc:spChg>
-        <pc:spChg chg="add mod">
-          <ac:chgData name="Marcia Moraes" userId="c9c67e8a-58e2-4733-9a1c-5d44fec4775b" providerId="ADAL" clId="{CC8A3895-9B1D-4E8D-B30E-808FECC1E1B4}" dt="2023-02-23T22:58:48.906" v="523" actId="20577"/>
-          <ac:spMkLst>
-            <pc:docMk/>
-            <pc:sldMk cId="564003476" sldId="274"/>
-            <ac:spMk id="7" creationId="{C9A73449-2FB0-4EB6-9A5F-6266B7508762}"/>
-          </ac:spMkLst>
-        </pc:spChg>
-        <pc:picChg chg="add mod">
-          <ac:chgData name="Marcia Moraes" userId="c9c67e8a-58e2-4733-9a1c-5d44fec4775b" providerId="ADAL" clId="{CC8A3895-9B1D-4E8D-B30E-808FECC1E1B4}" dt="2023-02-23T22:55:48.985" v="323" actId="1076"/>
-          <ac:picMkLst>
-            <pc:docMk/>
-            <pc:sldMk cId="564003476" sldId="274"/>
-            <ac:picMk id="4" creationId="{945CAD51-4638-4142-B0EF-8F0CA1129911}"/>
-          </ac:picMkLst>
-        </pc:picChg>
-      </pc:sldChg>
-      <pc:sldChg chg="addSp delSp modSp add delAnim modAnim">
-        <pc:chgData name="Marcia Moraes" userId="c9c67e8a-58e2-4733-9a1c-5d44fec4775b" providerId="ADAL" clId="{CC8A3895-9B1D-4E8D-B30E-808FECC1E1B4}" dt="2023-02-23T23:13:05.377" v="606"/>
-        <pc:sldMkLst>
-          <pc:docMk/>
-          <pc:sldMk cId="2926028301" sldId="275"/>
-        </pc:sldMkLst>
-        <pc:spChg chg="del">
-          <ac:chgData name="Marcia Moraes" userId="c9c67e8a-58e2-4733-9a1c-5d44fec4775b" providerId="ADAL" clId="{CC8A3895-9B1D-4E8D-B30E-808FECC1E1B4}" dt="2023-02-23T23:08:30.305" v="525" actId="478"/>
-          <ac:spMkLst>
-            <pc:docMk/>
-            <pc:sldMk cId="2926028301" sldId="275"/>
-            <ac:spMk id="5" creationId="{4AF8DBB4-337A-4276-964E-C6D3914E6C78}"/>
-          </ac:spMkLst>
-        </pc:spChg>
-        <pc:spChg chg="del">
-          <ac:chgData name="Marcia Moraes" userId="c9c67e8a-58e2-4733-9a1c-5d44fec4775b" providerId="ADAL" clId="{CC8A3895-9B1D-4E8D-B30E-808FECC1E1B4}" dt="2023-02-23T23:08:31.658" v="526" actId="478"/>
-          <ac:spMkLst>
-            <pc:docMk/>
-            <pc:sldMk cId="2926028301" sldId="275"/>
-            <ac:spMk id="6" creationId="{A6B1865B-C341-460C-972B-704AB84FEDC2}"/>
-          </ac:spMkLst>
-        </pc:spChg>
-        <pc:spChg chg="del">
-          <ac:chgData name="Marcia Moraes" userId="c9c67e8a-58e2-4733-9a1c-5d44fec4775b" providerId="ADAL" clId="{CC8A3895-9B1D-4E8D-B30E-808FECC1E1B4}" dt="2023-02-23T23:08:32.941" v="527" actId="478"/>
-          <ac:spMkLst>
-            <pc:docMk/>
-            <pc:sldMk cId="2926028301" sldId="275"/>
-            <ac:spMk id="7" creationId="{C9A73449-2FB0-4EB6-9A5F-6266B7508762}"/>
-          </ac:spMkLst>
-        </pc:spChg>
-        <pc:spChg chg="add mod">
-          <ac:chgData name="Marcia Moraes" userId="c9c67e8a-58e2-4733-9a1c-5d44fec4775b" providerId="ADAL" clId="{CC8A3895-9B1D-4E8D-B30E-808FECC1E1B4}" dt="2023-02-23T23:08:56.659" v="533" actId="1076"/>
-          <ac:spMkLst>
-            <pc:docMk/>
-            <pc:sldMk cId="2926028301" sldId="275"/>
-            <ac:spMk id="8" creationId="{D1345234-EB99-4577-A3EB-4693730B119D}"/>
-          </ac:spMkLst>
-        </pc:spChg>
-        <pc:spChg chg="add mod">
-          <ac:chgData name="Marcia Moraes" userId="c9c67e8a-58e2-4733-9a1c-5d44fec4775b" providerId="ADAL" clId="{CC8A3895-9B1D-4E8D-B30E-808FECC1E1B4}" dt="2023-02-23T23:09:11.753" v="562" actId="20577"/>
-          <ac:spMkLst>
-            <pc:docMk/>
-            <pc:sldMk cId="2926028301" sldId="275"/>
-            <ac:spMk id="9" creationId="{A4E5F255-953A-43FC-8BE9-DBF83FC26D1F}"/>
-          </ac:spMkLst>
-        </pc:spChg>
-        <pc:spChg chg="add mod">
-          <ac:chgData name="Marcia Moraes" userId="c9c67e8a-58e2-4733-9a1c-5d44fec4775b" providerId="ADAL" clId="{CC8A3895-9B1D-4E8D-B30E-808FECC1E1B4}" dt="2023-02-23T23:12:57.773" v="605" actId="207"/>
-          <ac:spMkLst>
-            <pc:docMk/>
-            <pc:sldMk cId="2926028301" sldId="275"/>
-            <ac:spMk id="10" creationId="{919C5E24-3952-461C-9BD5-A6E7E8A2631D}"/>
-          </ac:spMkLst>
-        </pc:spChg>
-      </pc:sldChg>
-      <pc:sldMasterChg chg="modSldLayout">
-        <pc:chgData name="Marcia Moraes" userId="c9c67e8a-58e2-4733-9a1c-5d44fec4775b" providerId="ADAL" clId="{CC8A3895-9B1D-4E8D-B30E-808FECC1E1B4}" dt="2023-02-23T23:29:57.431" v="726" actId="20577"/>
-        <pc:sldMasterMkLst>
-          <pc:docMk/>
-          <pc:sldMasterMk cId="3965733437" sldId="2147483648"/>
-        </pc:sldMasterMkLst>
-        <pc:sldLayoutChg chg="modSp">
-          <pc:chgData name="Marcia Moraes" userId="c9c67e8a-58e2-4733-9a1c-5d44fec4775b" providerId="ADAL" clId="{CC8A3895-9B1D-4E8D-B30E-808FECC1E1B4}" dt="2023-02-23T23:29:57.431" v="726" actId="20577"/>
-          <pc:sldLayoutMkLst>
-            <pc:docMk/>
-            <pc:sldMasterMk cId="3965733437" sldId="2147483648"/>
-            <pc:sldLayoutMk cId="0" sldId="2147483689"/>
-          </pc:sldLayoutMkLst>
-          <pc:spChg chg="mod">
-            <ac:chgData name="Marcia Moraes" userId="c9c67e8a-58e2-4733-9a1c-5d44fec4775b" providerId="ADAL" clId="{CC8A3895-9B1D-4E8D-B30E-808FECC1E1B4}" dt="2023-02-23T23:29:35.172" v="661" actId="1076"/>
-            <ac:spMkLst>
-              <pc:docMk/>
-              <pc:sldMasterMk cId="3965733437" sldId="2147483648"/>
-              <pc:sldLayoutMk cId="0" sldId="2147483689"/>
-              <ac:spMk id="9" creationId="{518974DB-51D0-2C49-9088-48CE2D84AB1C}"/>
-            </ac:spMkLst>
-          </pc:spChg>
-          <pc:spChg chg="mod">
-            <ac:chgData name="Marcia Moraes" userId="c9c67e8a-58e2-4733-9a1c-5d44fec4775b" providerId="ADAL" clId="{CC8A3895-9B1D-4E8D-B30E-808FECC1E1B4}" dt="2023-02-23T23:29:57.431" v="726" actId="20577"/>
-            <ac:spMkLst>
-              <pc:docMk/>
-              <pc:sldMasterMk cId="3965733437" sldId="2147483648"/>
-              <pc:sldLayoutMk cId="0" sldId="2147483689"/>
-              <ac:spMk id="11" creationId="{F621E987-BD36-AF48-B11C-CC4BAD65092F}"/>
-            </ac:spMkLst>
-          </pc:spChg>
-          <pc:picChg chg="mod">
-            <ac:chgData name="Marcia Moraes" userId="c9c67e8a-58e2-4733-9a1c-5d44fec4775b" providerId="ADAL" clId="{CC8A3895-9B1D-4E8D-B30E-808FECC1E1B4}" dt="2023-02-23T23:29:32.464" v="660" actId="1076"/>
-            <ac:picMkLst>
-              <pc:docMk/>
-              <pc:sldMasterMk cId="3965733437" sldId="2147483648"/>
-              <pc:sldLayoutMk cId="0" sldId="2147483689"/>
-              <ac:picMk id="7" creationId="{00000000-0000-0000-0000-000000000000}"/>
-            </ac:picMkLst>
-          </pc:picChg>
-        </pc:sldLayoutChg>
-      </pc:sldMasterChg>
-    </pc:docChg>
-  </pc:docChgLst>
-  <pc:docChgLst>
-    <pc:chgData name="Marcia Moraes" userId="c9c67e8a-58e2-4733-9a1c-5d44fec4775b" providerId="ADAL" clId="{EA7127AE-31EC-4AFB-91C6-2A0169B62BE0}"/>
-    <pc:docChg chg="custSel addSld delSld modSld sldOrd">
-      <pc:chgData name="Marcia Moraes" userId="c9c67e8a-58e2-4733-9a1c-5d44fec4775b" providerId="ADAL" clId="{EA7127AE-31EC-4AFB-91C6-2A0169B62BE0}" dt="2023-02-22T16:37:50.711" v="485" actId="1076"/>
-      <pc:docMkLst>
-        <pc:docMk/>
-      </pc:docMkLst>
-      <pc:sldChg chg="modSp">
-        <pc:chgData name="Marcia Moraes" userId="c9c67e8a-58e2-4733-9a1c-5d44fec4775b" providerId="ADAL" clId="{EA7127AE-31EC-4AFB-91C6-2A0169B62BE0}" dt="2023-02-22T15:36:06.427" v="13" actId="20577"/>
-        <pc:sldMkLst>
-          <pc:docMk/>
-          <pc:sldMk cId="661209559" sldId="256"/>
-        </pc:sldMkLst>
-        <pc:spChg chg="mod">
-          <ac:chgData name="Marcia Moraes" userId="c9c67e8a-58e2-4733-9a1c-5d44fec4775b" providerId="ADAL" clId="{EA7127AE-31EC-4AFB-91C6-2A0169B62BE0}" dt="2023-02-22T15:36:06.427" v="13" actId="20577"/>
-          <ac:spMkLst>
-            <pc:docMk/>
-            <pc:sldMk cId="661209559" sldId="256"/>
-            <ac:spMk id="4" creationId="{36830EDF-82C3-4D4E-8F52-61F2DB42DA11}"/>
-          </ac:spMkLst>
-        </pc:spChg>
-      </pc:sldChg>
-      <pc:sldChg chg="del">
-        <pc:chgData name="Marcia Moraes" userId="c9c67e8a-58e2-4733-9a1c-5d44fec4775b" providerId="ADAL" clId="{EA7127AE-31EC-4AFB-91C6-2A0169B62BE0}" dt="2023-02-22T15:59:14.019" v="166" actId="2696"/>
-        <pc:sldMkLst>
-          <pc:docMk/>
-          <pc:sldMk cId="2113302620" sldId="257"/>
-        </pc:sldMkLst>
-      </pc:sldChg>
-      <pc:sldChg chg="modSp">
-        <pc:chgData name="Marcia Moraes" userId="c9c67e8a-58e2-4733-9a1c-5d44fec4775b" providerId="ADAL" clId="{EA7127AE-31EC-4AFB-91C6-2A0169B62BE0}" dt="2023-02-22T16:04:11.786" v="222" actId="313"/>
-        <pc:sldMkLst>
-          <pc:docMk/>
-          <pc:sldMk cId="407826274" sldId="258"/>
-        </pc:sldMkLst>
-        <pc:spChg chg="mod">
-          <ac:chgData name="Marcia Moraes" userId="c9c67e8a-58e2-4733-9a1c-5d44fec4775b" providerId="ADAL" clId="{EA7127AE-31EC-4AFB-91C6-2A0169B62BE0}" dt="2023-02-22T16:01:14.682" v="221" actId="1076"/>
-          <ac:spMkLst>
-            <pc:docMk/>
-            <pc:sldMk cId="407826274" sldId="258"/>
-            <ac:spMk id="2" creationId="{90060E02-8434-E441-84DB-F40DBBF0FBD2}"/>
-          </ac:spMkLst>
-        </pc:spChg>
-        <pc:spChg chg="mod">
-          <ac:chgData name="Marcia Moraes" userId="c9c67e8a-58e2-4733-9a1c-5d44fec4775b" providerId="ADAL" clId="{EA7127AE-31EC-4AFB-91C6-2A0169B62BE0}" dt="2023-02-22T16:04:11.786" v="222" actId="313"/>
-          <ac:spMkLst>
-            <pc:docMk/>
-            <pc:sldMk cId="407826274" sldId="258"/>
-            <ac:spMk id="3" creationId="{C02A9C54-C7EA-6545-9B28-D71798E7BD0F}"/>
-          </ac:spMkLst>
-        </pc:spChg>
-        <pc:spChg chg="mod">
-          <ac:chgData name="Marcia Moraes" userId="c9c67e8a-58e2-4733-9a1c-5d44fec4775b" providerId="ADAL" clId="{EA7127AE-31EC-4AFB-91C6-2A0169B62BE0}" dt="2023-02-22T16:00:25.092" v="213" actId="1076"/>
-          <ac:spMkLst>
-            <pc:docMk/>
-            <pc:sldMk cId="407826274" sldId="258"/>
-            <ac:spMk id="11" creationId="{38B5EEA3-6FD4-DA45-BE82-39C2D4E31FFF}"/>
-          </ac:spMkLst>
-        </pc:spChg>
-        <pc:spChg chg="mod">
-          <ac:chgData name="Marcia Moraes" userId="c9c67e8a-58e2-4733-9a1c-5d44fec4775b" providerId="ADAL" clId="{EA7127AE-31EC-4AFB-91C6-2A0169B62BE0}" dt="2023-02-22T16:00:25.092" v="213" actId="1076"/>
-          <ac:spMkLst>
-            <pc:docMk/>
-            <pc:sldMk cId="407826274" sldId="258"/>
-            <ac:spMk id="13" creationId="{FF03C9D6-8EEF-754E-B157-10E7452FEDCA}"/>
-          </ac:spMkLst>
-        </pc:spChg>
-        <pc:spChg chg="mod">
-          <ac:chgData name="Marcia Moraes" userId="c9c67e8a-58e2-4733-9a1c-5d44fec4775b" providerId="ADAL" clId="{EA7127AE-31EC-4AFB-91C6-2A0169B62BE0}" dt="2023-02-22T16:00:25.092" v="213" actId="1076"/>
-          <ac:spMkLst>
-            <pc:docMk/>
-            <pc:sldMk cId="407826274" sldId="258"/>
-            <ac:spMk id="14" creationId="{15CE75E1-C219-A443-AEB0-C98C30C96FAA}"/>
-          </ac:spMkLst>
-        </pc:spChg>
-        <pc:spChg chg="mod">
-          <ac:chgData name="Marcia Moraes" userId="c9c67e8a-58e2-4733-9a1c-5d44fec4775b" providerId="ADAL" clId="{EA7127AE-31EC-4AFB-91C6-2A0169B62BE0}" dt="2023-02-22T16:00:25.092" v="213" actId="1076"/>
-          <ac:spMkLst>
-            <pc:docMk/>
-            <pc:sldMk cId="407826274" sldId="258"/>
-            <ac:spMk id="15" creationId="{29E895D7-4A3D-2649-A596-95AFBC58D4C3}"/>
-          </ac:spMkLst>
-        </pc:spChg>
-        <pc:grpChg chg="mod">
-          <ac:chgData name="Marcia Moraes" userId="c9c67e8a-58e2-4733-9a1c-5d44fec4775b" providerId="ADAL" clId="{EA7127AE-31EC-4AFB-91C6-2A0169B62BE0}" dt="2023-02-22T16:00:25.092" v="213" actId="1076"/>
-          <ac:grpSpMkLst>
-            <pc:docMk/>
-            <pc:sldMk cId="407826274" sldId="258"/>
-            <ac:grpSpMk id="4" creationId="{70D961CE-F386-9D4A-AC56-FA4FF9CAAD4F}"/>
-          </ac:grpSpMkLst>
-        </pc:grpChg>
-        <pc:cxnChg chg="mod">
-          <ac:chgData name="Marcia Moraes" userId="c9c67e8a-58e2-4733-9a1c-5d44fec4775b" providerId="ADAL" clId="{EA7127AE-31EC-4AFB-91C6-2A0169B62BE0}" dt="2023-02-22T16:00:25.092" v="213" actId="1076"/>
-          <ac:cxnSpMkLst>
-            <pc:docMk/>
-            <pc:sldMk cId="407826274" sldId="258"/>
-            <ac:cxnSpMk id="12" creationId="{E08B362F-300B-A648-8B73-8E490BC13D1C}"/>
-          </ac:cxnSpMkLst>
-        </pc:cxnChg>
-      </pc:sldChg>
-      <pc:sldChg chg="addSp delSp modSp delAnim modAnim">
-        <pc:chgData name="Marcia Moraes" userId="c9c67e8a-58e2-4733-9a1c-5d44fec4775b" providerId="ADAL" clId="{EA7127AE-31EC-4AFB-91C6-2A0169B62BE0}" dt="2023-02-22T16:26:56.964" v="400" actId="478"/>
-        <pc:sldMkLst>
-          <pc:docMk/>
-          <pc:sldMk cId="1343308855" sldId="259"/>
-        </pc:sldMkLst>
-        <pc:spChg chg="mod">
-          <ac:chgData name="Marcia Moraes" userId="c9c67e8a-58e2-4733-9a1c-5d44fec4775b" providerId="ADAL" clId="{EA7127AE-31EC-4AFB-91C6-2A0169B62BE0}" dt="2023-02-22T16:12:09.046" v="263" actId="1076"/>
-          <ac:spMkLst>
-            <pc:docMk/>
-            <pc:sldMk cId="1343308855" sldId="259"/>
-            <ac:spMk id="2" creationId="{F2B66675-0B8D-544E-A1CF-AEA307CA809F}"/>
-          </ac:spMkLst>
-        </pc:spChg>
-        <pc:spChg chg="mod">
-          <ac:chgData name="Marcia Moraes" userId="c9c67e8a-58e2-4733-9a1c-5d44fec4775b" providerId="ADAL" clId="{EA7127AE-31EC-4AFB-91C6-2A0169B62BE0}" dt="2023-02-22T16:16:19.871" v="343"/>
-          <ac:spMkLst>
-            <pc:docMk/>
-            <pc:sldMk cId="1343308855" sldId="259"/>
-            <ac:spMk id="3" creationId="{BB2E3F74-0B0A-6547-9986-48509F1F6B1B}"/>
-          </ac:spMkLst>
-        </pc:spChg>
-        <pc:spChg chg="add mod">
-          <ac:chgData name="Marcia Moraes" userId="c9c67e8a-58e2-4733-9a1c-5d44fec4775b" providerId="ADAL" clId="{EA7127AE-31EC-4AFB-91C6-2A0169B62BE0}" dt="2023-02-22T16:14:21.490" v="325" actId="1076"/>
-          <ac:spMkLst>
-            <pc:docMk/>
-            <pc:sldMk cId="1343308855" sldId="259"/>
-            <ac:spMk id="6" creationId="{F42DEEB7-5CA3-41F8-9A0C-CC21CB114F7B}"/>
-          </ac:spMkLst>
-        </pc:spChg>
-        <pc:spChg chg="add mod">
-          <ac:chgData name="Marcia Moraes" userId="c9c67e8a-58e2-4733-9a1c-5d44fec4775b" providerId="ADAL" clId="{EA7127AE-31EC-4AFB-91C6-2A0169B62BE0}" dt="2023-02-22T16:16:16.478" v="342" actId="1076"/>
-          <ac:spMkLst>
-            <pc:docMk/>
-            <pc:sldMk cId="1343308855" sldId="259"/>
-            <ac:spMk id="20" creationId="{D8959A4F-8D87-485F-A00C-FD5BD49661FE}"/>
-          </ac:spMkLst>
-        </pc:spChg>
-        <pc:spChg chg="add mod">
-          <ac:chgData name="Marcia Moraes" userId="c9c67e8a-58e2-4733-9a1c-5d44fec4775b" providerId="ADAL" clId="{EA7127AE-31EC-4AFB-91C6-2A0169B62BE0}" dt="2023-02-22T16:17:20.596" v="358" actId="1076"/>
-          <ac:spMkLst>
-            <pc:docMk/>
-            <pc:sldMk cId="1343308855" sldId="259"/>
-            <ac:spMk id="21" creationId="{C77F46D6-3D91-4C0A-9BFD-35258A65A54D}"/>
-          </ac:spMkLst>
-        </pc:spChg>
-        <pc:spChg chg="mod">
-          <ac:chgData name="Marcia Moraes" userId="c9c67e8a-58e2-4733-9a1c-5d44fec4775b" providerId="ADAL" clId="{EA7127AE-31EC-4AFB-91C6-2A0169B62BE0}" dt="2023-02-22T16:17:25.730" v="359" actId="1076"/>
-          <ac:spMkLst>
-            <pc:docMk/>
-            <pc:sldMk cId="1343308855" sldId="259"/>
-            <ac:spMk id="35" creationId="{FCFCC514-5C39-9545-9B58-05FFC97770E4}"/>
-          </ac:spMkLst>
-        </pc:spChg>
-        <pc:spChg chg="mod">
-          <ac:chgData name="Marcia Moraes" userId="c9c67e8a-58e2-4733-9a1c-5d44fec4775b" providerId="ADAL" clId="{EA7127AE-31EC-4AFB-91C6-2A0169B62BE0}" dt="2023-02-22T16:17:28.503" v="360" actId="1076"/>
-          <ac:spMkLst>
-            <pc:docMk/>
-            <pc:sldMk cId="1343308855" sldId="259"/>
-            <ac:spMk id="41" creationId="{97B1C44E-3A0B-1749-BB0A-F74A554C85B3}"/>
-          </ac:spMkLst>
-        </pc:spChg>
-        <pc:spChg chg="add mod">
-          <ac:chgData name="Marcia Moraes" userId="c9c67e8a-58e2-4733-9a1c-5d44fec4775b" providerId="ADAL" clId="{EA7127AE-31EC-4AFB-91C6-2A0169B62BE0}" dt="2023-02-22T16:16:28.482" v="346"/>
-          <ac:spMkLst>
-            <pc:docMk/>
-            <pc:sldMk cId="1343308855" sldId="259"/>
-            <ac:spMk id="42" creationId="{E5C89EAB-76A1-4FC2-81D3-8AE616B33CD7}"/>
-          </ac:spMkLst>
-        </pc:spChg>
-        <pc:spChg chg="add mod">
-          <ac:chgData name="Marcia Moraes" userId="c9c67e8a-58e2-4733-9a1c-5d44fec4775b" providerId="ADAL" clId="{EA7127AE-31EC-4AFB-91C6-2A0169B62BE0}" dt="2023-02-22T16:16:35.648" v="348" actId="1076"/>
-          <ac:spMkLst>
-            <pc:docMk/>
-            <pc:sldMk cId="1343308855" sldId="259"/>
-            <ac:spMk id="43" creationId="{9A2F6A80-599E-4203-BFBC-14604A4AD698}"/>
-          </ac:spMkLst>
-        </pc:spChg>
-        <pc:spChg chg="add mod">
-          <ac:chgData name="Marcia Moraes" userId="c9c67e8a-58e2-4733-9a1c-5d44fec4775b" providerId="ADAL" clId="{EA7127AE-31EC-4AFB-91C6-2A0169B62BE0}" dt="2023-02-22T16:17:33.072" v="361" actId="1076"/>
-          <ac:spMkLst>
-            <pc:docMk/>
-            <pc:sldMk cId="1343308855" sldId="259"/>
-            <ac:spMk id="44" creationId="{F12C7A14-A27B-46F1-A420-1A867B298A92}"/>
-          </ac:spMkLst>
-        </pc:spChg>
-        <pc:spChg chg="add del mod">
-          <ac:chgData name="Marcia Moraes" userId="c9c67e8a-58e2-4733-9a1c-5d44fec4775b" providerId="ADAL" clId="{EA7127AE-31EC-4AFB-91C6-2A0169B62BE0}" dt="2023-02-22T16:26:56.964" v="400" actId="478"/>
-          <ac:spMkLst>
-            <pc:docMk/>
-            <pc:sldMk cId="1343308855" sldId="259"/>
-            <ac:spMk id="45" creationId="{279FD905-364F-4C6E-9FB4-7C04289A0F83}"/>
-          </ac:spMkLst>
-        </pc:spChg>
-        <pc:spChg chg="del">
-          <ac:chgData name="Marcia Moraes" userId="c9c67e8a-58e2-4733-9a1c-5d44fec4775b" providerId="ADAL" clId="{EA7127AE-31EC-4AFB-91C6-2A0169B62BE0}" dt="2023-02-22T16:12:18.631" v="264" actId="478"/>
-          <ac:spMkLst>
-            <pc:docMk/>
-            <pc:sldMk cId="1343308855" sldId="259"/>
-            <ac:spMk id="50" creationId="{FF25C755-82FF-5348-8E69-934F050CFECB}"/>
-          </ac:spMkLst>
-        </pc:spChg>
-        <pc:spChg chg="add mod">
-          <ac:chgData name="Marcia Moraes" userId="c9c67e8a-58e2-4733-9a1c-5d44fec4775b" providerId="ADAL" clId="{EA7127AE-31EC-4AFB-91C6-2A0169B62BE0}" dt="2023-02-22T16:16:12.001" v="341" actId="1076"/>
-          <ac:spMkLst>
-            <pc:docMk/>
-            <pc:sldMk cId="1343308855" sldId="259"/>
-            <ac:spMk id="51" creationId="{07F618AB-0633-42A7-8E70-633C5FE07A16}"/>
-          </ac:spMkLst>
-        </pc:spChg>
-        <pc:spChg chg="add mod">
-          <ac:chgData name="Marcia Moraes" userId="c9c67e8a-58e2-4733-9a1c-5d44fec4775b" providerId="ADAL" clId="{EA7127AE-31EC-4AFB-91C6-2A0169B62BE0}" dt="2023-02-22T16:16:49.432" v="352" actId="1076"/>
-          <ac:spMkLst>
-            <pc:docMk/>
-            <pc:sldMk cId="1343308855" sldId="259"/>
-            <ac:spMk id="52" creationId="{3A9E3D22-2E04-4BC7-A800-B37D4D95A7C3}"/>
-          </ac:spMkLst>
-        </pc:spChg>
-        <pc:spChg chg="add mod">
-          <ac:chgData name="Marcia Moraes" userId="c9c67e8a-58e2-4733-9a1c-5d44fec4775b" providerId="ADAL" clId="{EA7127AE-31EC-4AFB-91C6-2A0169B62BE0}" dt="2023-02-22T16:24:55.524" v="383" actId="20577"/>
-          <ac:spMkLst>
-            <pc:docMk/>
-            <pc:sldMk cId="1343308855" sldId="259"/>
-            <ac:spMk id="53" creationId="{52CC0527-5F74-40D7-A571-E8439DB2D910}"/>
-          </ac:spMkLst>
-        </pc:spChg>
-        <pc:spChg chg="add mod">
-          <ac:chgData name="Marcia Moraes" userId="c9c67e8a-58e2-4733-9a1c-5d44fec4775b" providerId="ADAL" clId="{EA7127AE-31EC-4AFB-91C6-2A0169B62BE0}" dt="2023-02-22T16:25:35.223" v="389" actId="20577"/>
-          <ac:spMkLst>
-            <pc:docMk/>
-            <pc:sldMk cId="1343308855" sldId="259"/>
-            <ac:spMk id="54" creationId="{B2278DC8-1627-42DB-8479-D32302CC0993}"/>
-          </ac:spMkLst>
-        </pc:spChg>
-        <pc:spChg chg="add mod">
-          <ac:chgData name="Marcia Moraes" userId="c9c67e8a-58e2-4733-9a1c-5d44fec4775b" providerId="ADAL" clId="{EA7127AE-31EC-4AFB-91C6-2A0169B62BE0}" dt="2023-02-22T16:26:42.274" v="399" actId="20577"/>
-          <ac:spMkLst>
-            <pc:docMk/>
-            <pc:sldMk cId="1343308855" sldId="259"/>
-            <ac:spMk id="55" creationId="{600E014F-46F5-4934-8088-1261B39A9913}"/>
-          </ac:spMkLst>
-        </pc:spChg>
-      </pc:sldChg>
-      <pc:sldChg chg="ord">
-        <pc:chgData name="Marcia Moraes" userId="c9c67e8a-58e2-4733-9a1c-5d44fec4775b" providerId="ADAL" clId="{EA7127AE-31EC-4AFB-91C6-2A0169B62BE0}" dt="2023-02-22T16:27:06.919" v="401"/>
-        <pc:sldMkLst>
-          <pc:docMk/>
-          <pc:sldMk cId="2819649150" sldId="260"/>
-        </pc:sldMkLst>
-      </pc:sldChg>
-      <pc:sldChg chg="modSp">
-        <pc:chgData name="Marcia Moraes" userId="c9c67e8a-58e2-4733-9a1c-5d44fec4775b" providerId="ADAL" clId="{EA7127AE-31EC-4AFB-91C6-2A0169B62BE0}" dt="2023-02-22T16:37:50.711" v="485" actId="1076"/>
-        <pc:sldMkLst>
-          <pc:docMk/>
-          <pc:sldMk cId="517950337" sldId="264"/>
-        </pc:sldMkLst>
-        <pc:spChg chg="mod">
-          <ac:chgData name="Marcia Moraes" userId="c9c67e8a-58e2-4733-9a1c-5d44fec4775b" providerId="ADAL" clId="{EA7127AE-31EC-4AFB-91C6-2A0169B62BE0}" dt="2023-02-22T16:37:36.588" v="481" actId="14100"/>
-          <ac:spMkLst>
-            <pc:docMk/>
-            <pc:sldMk cId="517950337" sldId="264"/>
-            <ac:spMk id="3" creationId="{69C8F260-181B-4E56-A55E-0C248418EB45}"/>
-          </ac:spMkLst>
-        </pc:spChg>
-        <pc:spChg chg="mod">
-          <ac:chgData name="Marcia Moraes" userId="c9c67e8a-58e2-4733-9a1c-5d44fec4775b" providerId="ADAL" clId="{EA7127AE-31EC-4AFB-91C6-2A0169B62BE0}" dt="2023-02-22T16:37:50.711" v="485" actId="1076"/>
-          <ac:spMkLst>
-            <pc:docMk/>
-            <pc:sldMk cId="517950337" sldId="264"/>
-            <ac:spMk id="5" creationId="{A94513F3-5A4B-4FA4-A070-ED9CE1FAC993}"/>
-          </ac:spMkLst>
-        </pc:spChg>
-      </pc:sldChg>
-      <pc:sldChg chg="addSp delSp modSp add">
-        <pc:chgData name="Marcia Moraes" userId="c9c67e8a-58e2-4733-9a1c-5d44fec4775b" providerId="ADAL" clId="{EA7127AE-31EC-4AFB-91C6-2A0169B62BE0}" dt="2023-02-22T15:46:21.805" v="25" actId="1076"/>
+      <pc:sldChg chg="addSp modSp">
+        <pc:chgData name="Marcia Moraes" userId="c9c67e8a-58e2-4733-9a1c-5d44fec4775b" providerId="ADAL" clId="{F9CDF985-13F2-499A-8A55-943F22618C3C}" dt="2023-09-14T13:59:35.254" v="173" actId="20577"/>
         <pc:sldMkLst>
           <pc:docMk/>
           <pc:sldMk cId="2019265180" sldId="270"/>
         </pc:sldMkLst>
-        <pc:spChg chg="mod">
-          <ac:chgData name="Marcia Moraes" userId="c9c67e8a-58e2-4733-9a1c-5d44fec4775b" providerId="ADAL" clId="{EA7127AE-31EC-4AFB-91C6-2A0169B62BE0}" dt="2023-02-22T15:46:21.805" v="25" actId="1076"/>
+        <pc:spChg chg="add mod">
+          <ac:chgData name="Marcia Moraes" userId="c9c67e8a-58e2-4733-9a1c-5d44fec4775b" providerId="ADAL" clId="{F9CDF985-13F2-499A-8A55-943F22618C3C}" dt="2023-09-14T13:59:35.254" v="173" actId="20577"/>
           <ac:spMkLst>
             <pc:docMk/>
             <pc:sldMk cId="2019265180" sldId="270"/>
-            <ac:spMk id="2" creationId="{05CD00A8-A4FA-4E9B-9199-C0E207B0496C}"/>
+            <ac:spMk id="5" creationId="{24E59D90-8018-493E-AFF9-3C08F4AFF82A}"/>
           </ac:spMkLst>
         </pc:spChg>
         <pc:spChg chg="mod">
-          <ac:chgData name="Marcia Moraes" userId="c9c67e8a-58e2-4733-9a1c-5d44fec4775b" providerId="ADAL" clId="{EA7127AE-31EC-4AFB-91C6-2A0169B62BE0}" dt="2023-02-22T15:39:17.455" v="17" actId="6549"/>
+          <ac:chgData name="Marcia Moraes" userId="c9c67e8a-58e2-4733-9a1c-5d44fec4775b" providerId="ADAL" clId="{F9CDF985-13F2-499A-8A55-943F22618C3C}" dt="2023-09-14T13:57:27.049" v="138" actId="20577"/>
           <ac:spMkLst>
             <pc:docMk/>
             <pc:sldMk cId="2019265180" sldId="270"/>
             <ac:spMk id="7" creationId="{900B76C7-4821-426C-9C80-6ADC6DD0EA77}"/>
           </ac:spMkLst>
         </pc:spChg>
-        <pc:picChg chg="add mod">
-          <ac:chgData name="Marcia Moraes" userId="c9c67e8a-58e2-4733-9a1c-5d44fec4775b" providerId="ADAL" clId="{EA7127AE-31EC-4AFB-91C6-2A0169B62BE0}" dt="2023-02-22T15:45:33.392" v="21" actId="1076"/>
-          <ac:picMkLst>
+        <pc:graphicFrameChg chg="add mod modGraphic">
+          <ac:chgData name="Marcia Moraes" userId="c9c67e8a-58e2-4733-9a1c-5d44fec4775b" providerId="ADAL" clId="{F9CDF985-13F2-499A-8A55-943F22618C3C}" dt="2023-09-14T13:58:52.778" v="144" actId="14734"/>
+          <ac:graphicFrameMkLst>
             <pc:docMk/>
             <pc:sldMk cId="2019265180" sldId="270"/>
-            <ac:picMk id="1026" creationId="{FA180B9E-6C50-4161-9B7C-073A82DBEF38}"/>
-          </ac:picMkLst>
-        </pc:picChg>
-        <pc:picChg chg="del">
-          <ac:chgData name="Marcia Moraes" userId="c9c67e8a-58e2-4733-9a1c-5d44fec4775b" providerId="ADAL" clId="{EA7127AE-31EC-4AFB-91C6-2A0169B62BE0}" dt="2023-02-22T15:45:25.852" v="18" actId="478"/>
-          <ac:picMkLst>
-            <pc:docMk/>
-            <pc:sldMk cId="2019265180" sldId="270"/>
-            <ac:picMk id="1028" creationId="{CC9B3497-F325-4068-931A-CE35C7BD7EA5}"/>
-          </ac:picMkLst>
-        </pc:picChg>
+            <ac:graphicFrameMk id="3" creationId="{4A37E52F-0E20-4E7D-996C-8020D7FF679E}"/>
+          </ac:graphicFrameMkLst>
+        </pc:graphicFrameChg>
       </pc:sldChg>
-      <pc:sldChg chg="modSp add">
-        <pc:chgData name="Marcia Moraes" userId="c9c67e8a-58e2-4733-9a1c-5d44fec4775b" providerId="ADAL" clId="{EA7127AE-31EC-4AFB-91C6-2A0169B62BE0}" dt="2023-02-22T15:58:40.535" v="165" actId="6549"/>
+      <pc:sldChg chg="modSp">
+        <pc:chgData name="Marcia Moraes" userId="c9c67e8a-58e2-4733-9a1c-5d44fec4775b" providerId="ADAL" clId="{F9CDF985-13F2-499A-8A55-943F22618C3C}" dt="2023-09-14T13:56:56.723" v="13"/>
         <pc:sldMkLst>
           <pc:docMk/>
           <pc:sldMk cId="2302936247" sldId="272"/>
         </pc:sldMkLst>
         <pc:spChg chg="mod">
-          <ac:chgData name="Marcia Moraes" userId="c9c67e8a-58e2-4733-9a1c-5d44fec4775b" providerId="ADAL" clId="{EA7127AE-31EC-4AFB-91C6-2A0169B62BE0}" dt="2023-02-22T15:58:40.535" v="165" actId="6549"/>
+          <ac:chgData name="Marcia Moraes" userId="c9c67e8a-58e2-4733-9a1c-5d44fec4775b" providerId="ADAL" clId="{F9CDF985-13F2-499A-8A55-943F22618C3C}" dt="2023-09-14T13:56:56.723" v="13"/>
           <ac:spMkLst>
             <pc:docMk/>
             <pc:sldMk cId="2302936247" sldId="272"/>
@@ -718,94 +203,10 @@
           </ac:spMkLst>
         </pc:spChg>
       </pc:sldChg>
-      <pc:sldChg chg="addSp delSp modSp add">
-        <pc:chgData name="Marcia Moraes" userId="c9c67e8a-58e2-4733-9a1c-5d44fec4775b" providerId="ADAL" clId="{EA7127AE-31EC-4AFB-91C6-2A0169B62BE0}" dt="2023-02-22T16:07:08.193" v="244" actId="1076"/>
-        <pc:sldMkLst>
-          <pc:docMk/>
-          <pc:sldMk cId="4235027745" sldId="273"/>
-        </pc:sldMkLst>
-        <pc:spChg chg="mod">
-          <ac:chgData name="Marcia Moraes" userId="c9c67e8a-58e2-4733-9a1c-5d44fec4775b" providerId="ADAL" clId="{EA7127AE-31EC-4AFB-91C6-2A0169B62BE0}" dt="2023-02-22T16:04:50.413" v="238" actId="20577"/>
-          <ac:spMkLst>
-            <pc:docMk/>
-            <pc:sldMk cId="4235027745" sldId="273"/>
-            <ac:spMk id="2" creationId="{90060E02-8434-E441-84DB-F40DBBF0FBD2}"/>
-          </ac:spMkLst>
-        </pc:spChg>
-        <pc:spChg chg="del">
-          <ac:chgData name="Marcia Moraes" userId="c9c67e8a-58e2-4733-9a1c-5d44fec4775b" providerId="ADAL" clId="{EA7127AE-31EC-4AFB-91C6-2A0169B62BE0}" dt="2023-02-22T16:05:02.091" v="241" actId="478"/>
-          <ac:spMkLst>
-            <pc:docMk/>
-            <pc:sldMk cId="4235027745" sldId="273"/>
-            <ac:spMk id="3" creationId="{C02A9C54-C7EA-6545-9B28-D71798E7BD0F}"/>
-          </ac:spMkLst>
-        </pc:spChg>
-        <pc:spChg chg="del">
-          <ac:chgData name="Marcia Moraes" userId="c9c67e8a-58e2-4733-9a1c-5d44fec4775b" providerId="ADAL" clId="{EA7127AE-31EC-4AFB-91C6-2A0169B62BE0}" dt="2023-02-22T16:04:59.615" v="240" actId="478"/>
-          <ac:spMkLst>
-            <pc:docMk/>
-            <pc:sldMk cId="4235027745" sldId="273"/>
-            <ac:spMk id="11" creationId="{38B5EEA3-6FD4-DA45-BE82-39C2D4E31FFF}"/>
-          </ac:spMkLst>
-        </pc:spChg>
-        <pc:spChg chg="del">
-          <ac:chgData name="Marcia Moraes" userId="c9c67e8a-58e2-4733-9a1c-5d44fec4775b" providerId="ADAL" clId="{EA7127AE-31EC-4AFB-91C6-2A0169B62BE0}" dt="2023-02-22T16:04:57.688" v="239" actId="478"/>
-          <ac:spMkLst>
-            <pc:docMk/>
-            <pc:sldMk cId="4235027745" sldId="273"/>
-            <ac:spMk id="13" creationId="{FF03C9D6-8EEF-754E-B157-10E7452FEDCA}"/>
-          </ac:spMkLst>
-        </pc:spChg>
-        <pc:spChg chg="del">
-          <ac:chgData name="Marcia Moraes" userId="c9c67e8a-58e2-4733-9a1c-5d44fec4775b" providerId="ADAL" clId="{EA7127AE-31EC-4AFB-91C6-2A0169B62BE0}" dt="2023-02-22T16:04:57.688" v="239" actId="478"/>
-          <ac:spMkLst>
-            <pc:docMk/>
-            <pc:sldMk cId="4235027745" sldId="273"/>
-            <ac:spMk id="14" creationId="{15CE75E1-C219-A443-AEB0-C98C30C96FAA}"/>
-          </ac:spMkLst>
-        </pc:spChg>
-        <pc:spChg chg="del">
-          <ac:chgData name="Marcia Moraes" userId="c9c67e8a-58e2-4733-9a1c-5d44fec4775b" providerId="ADAL" clId="{EA7127AE-31EC-4AFB-91C6-2A0169B62BE0}" dt="2023-02-22T16:04:57.688" v="239" actId="478"/>
-          <ac:spMkLst>
-            <pc:docMk/>
-            <pc:sldMk cId="4235027745" sldId="273"/>
-            <ac:spMk id="15" creationId="{29E895D7-4A3D-2649-A596-95AFBC58D4C3}"/>
-          </ac:spMkLst>
-        </pc:spChg>
-        <pc:spChg chg="add del mod">
-          <ac:chgData name="Marcia Moraes" userId="c9c67e8a-58e2-4733-9a1c-5d44fec4775b" providerId="ADAL" clId="{EA7127AE-31EC-4AFB-91C6-2A0169B62BE0}" dt="2023-02-22T16:07:03.772" v="242" actId="478"/>
-          <ac:spMkLst>
-            <pc:docMk/>
-            <pc:sldMk cId="4235027745" sldId="273"/>
-            <ac:spMk id="17" creationId="{C92F05CC-ACF3-444B-8A76-434DCA6022B0}"/>
-          </ac:spMkLst>
-        </pc:spChg>
-        <pc:grpChg chg="del">
-          <ac:chgData name="Marcia Moraes" userId="c9c67e8a-58e2-4733-9a1c-5d44fec4775b" providerId="ADAL" clId="{EA7127AE-31EC-4AFB-91C6-2A0169B62BE0}" dt="2023-02-22T16:04:57.688" v="239" actId="478"/>
-          <ac:grpSpMkLst>
-            <pc:docMk/>
-            <pc:sldMk cId="4235027745" sldId="273"/>
-            <ac:grpSpMk id="4" creationId="{70D961CE-F386-9D4A-AC56-FA4FF9CAAD4F}"/>
-          </ac:grpSpMkLst>
-        </pc:grpChg>
-        <pc:picChg chg="add mod">
-          <ac:chgData name="Marcia Moraes" userId="c9c67e8a-58e2-4733-9a1c-5d44fec4775b" providerId="ADAL" clId="{EA7127AE-31EC-4AFB-91C6-2A0169B62BE0}" dt="2023-02-22T16:07:08.193" v="244" actId="1076"/>
-          <ac:picMkLst>
-            <pc:docMk/>
-            <pc:sldMk cId="4235027745" sldId="273"/>
-            <ac:picMk id="18" creationId="{5B6CB869-3762-4BDB-A04E-57741B357D95}"/>
-          </ac:picMkLst>
-        </pc:picChg>
-        <pc:cxnChg chg="del mod">
-          <ac:chgData name="Marcia Moraes" userId="c9c67e8a-58e2-4733-9a1c-5d44fec4775b" providerId="ADAL" clId="{EA7127AE-31EC-4AFB-91C6-2A0169B62BE0}" dt="2023-02-22T16:04:57.688" v="239" actId="478"/>
-          <ac:cxnSpMkLst>
-            <pc:docMk/>
-            <pc:sldMk cId="4235027745" sldId="273"/>
-            <ac:cxnSpMk id="12" creationId="{E08B362F-300B-A648-8B73-8E490BC13D1C}"/>
-          </ac:cxnSpMkLst>
-        </pc:cxnChg>
-      </pc:sldChg>
     </pc:docChg>
+  </pc:docChgLst>
+  <pc:docChgLst>
+    <pc:chgData name="Marcia Moraes" userId="c9c67e8a-58e2-4733-9a1c-5d44fec4775b" providerId="ADAL" clId="{EA7127AE-31EC-4AFB-91C6-2A0169B62BE0}"/>
   </pc:docChgLst>
 </pc:chgInfo>
 </file>
@@ -892,7 +293,7 @@
           <a:p>
             <a:fld id="{4D7E51A5-B478-1E40-8CBB-0DAA8831E99D}" type="datetimeFigureOut">
               <a:rPr lang="en-US" smtClean="0"/>
-              <a:t>2/23/2023</a:t>
+              <a:t>9/14/2023</a:t>
             </a:fld>
             <a:endParaRPr lang="en-US"/>
           </a:p>
@@ -1057,7 +458,7 @@
           <a:p>
             <a:fld id="{D0ED587F-861E-6740-9643-E3DDAE89B8D6}" type="datetimeFigureOut">
               <a:rPr lang="en-US" smtClean="0"/>
-              <a:t>2/23/2023</a:t>
+              <a:t>9/14/2023</a:t>
             </a:fld>
             <a:endParaRPr lang="en-US"/>
           </a:p>
@@ -11892,14 +11293,22 @@
             <a:pPr lvl="1"/>
             <a:r>
               <a:rPr lang="en-US" sz="2400" dirty="0"/>
-              <a:t>Example: sub(“SATOROTAS”, “O”)  // return ROTAS</a:t>
+              <a:t>Example: sub(“SATOROTAS”, ‘O’)  // return ROTAS</a:t>
             </a:r>
           </a:p>
           <a:p>
             <a:pPr lvl="1"/>
             <a:r>
               <a:rPr lang="en-US" sz="2400" dirty="0"/>
-              <a:t>Example: sub(“SATOROTAS”, “A”) // returns TOROTAS</a:t>
+              <a:t>Example: sub(“SATOROTAS</a:t>
+            </a:r>
+            <a:r>
+              <a:rPr lang="en-US" sz="2400"/>
+              <a:t>”, ‘A’) </a:t>
+            </a:r>
+            <a:r>
+              <a:rPr lang="en-US" sz="2400" dirty="0"/>
+              <a:t>// returns TOROTAS</a:t>
             </a:r>
           </a:p>
           <a:p>
@@ -12637,7 +12046,7 @@
                 <a:cs typeface="Arial"/>
                 <a:sym typeface="Arial"/>
               </a:rPr>
-              <a:t>Lab 07</a:t>
+              <a:t>Lab 07 - go to your lab to have the participation points</a:t>
             </a:r>
           </a:p>
           <a:p>
@@ -12739,7 +12148,7 @@
                 <a:cs typeface="Arial"/>
                 <a:sym typeface="Arial"/>
               </a:rPr>
-              <a:t>Lab 08</a:t>
+              <a:t>Lab 08 – go to your lab to have the participation points</a:t>
             </a:r>
           </a:p>
           <a:p>
@@ -13088,6 +12497,1033 @@
           </a:extLst>
         </p:spPr>
       </p:pic>
+      <p:graphicFrame>
+        <p:nvGraphicFramePr>
+          <p:cNvPr id="3" name="Table 2">
+            <a:extLst>
+              <a:ext uri="{FF2B5EF4-FFF2-40B4-BE49-F238E27FC236}">
+                <a16:creationId xmlns:a16="http://schemas.microsoft.com/office/drawing/2014/main" id="{4A37E52F-0E20-4E7D-996C-8020D7FF679E}"/>
+              </a:ext>
+            </a:extLst>
+          </p:cNvPr>
+          <p:cNvGraphicFramePr>
+            <a:graphicFrameLocks noGrp="1"/>
+          </p:cNvGraphicFramePr>
+          <p:nvPr>
+            <p:extLst>
+              <p:ext uri="{D42A27DB-BD31-4B8C-83A1-F6EECF244321}">
+                <p14:modId xmlns:p14="http://schemas.microsoft.com/office/powerpoint/2010/main" val="1966181233"/>
+              </p:ext>
+            </p:extLst>
+          </p:nvPr>
+        </p:nvGraphicFramePr>
+        <p:xfrm>
+          <a:off x="10025176" y="3822831"/>
+          <a:ext cx="3671207" cy="3097098"/>
+        </p:xfrm>
+        <a:graphic>
+          <a:graphicData uri="http://schemas.openxmlformats.org/drawingml/2006/table">
+            <a:tbl>
+              <a:tblPr/>
+              <a:tblGrid>
+                <a:gridCol w="1197995">
+                  <a:extLst>
+                    <a:ext uri="{9D8B030D-6E8A-4147-A177-3AD203B41FA5}">
+                      <a16:colId xmlns:a16="http://schemas.microsoft.com/office/drawing/2014/main" val="3463123554"/>
+                    </a:ext>
+                  </a:extLst>
+                </a:gridCol>
+                <a:gridCol w="2473212">
+                  <a:extLst>
+                    <a:ext uri="{9D8B030D-6E8A-4147-A177-3AD203B41FA5}">
+                      <a16:colId xmlns:a16="http://schemas.microsoft.com/office/drawing/2014/main" val="378576746"/>
+                    </a:ext>
+                  </a:extLst>
+                </a:gridCol>
+              </a:tblGrid>
+              <a:tr h="289830">
+                <a:tc>
+                  <a:txBody>
+                    <a:bodyPr/>
+                    <a:lstStyle/>
+                    <a:p>
+                      <a:pPr algn="l"/>
+                      <a:r>
+                        <a:rPr lang="en-US" sz="1700">
+                          <a:solidFill>
+                            <a:srgbClr val="000000"/>
+                          </a:solidFill>
+                          <a:effectLst/>
+                        </a:rPr>
+                        <a:t>Day</a:t>
+                      </a:r>
+                    </a:p>
+                  </a:txBody>
+                  <a:tcPr marL="15681" marR="15681" marT="15681" marB="15681" anchor="ctr">
+                    <a:lnL w="6350" cap="flat" cmpd="sng" algn="ctr">
+                      <a:solidFill>
+                        <a:srgbClr val="E0E0E0"/>
+                      </a:solidFill>
+                      <a:prstDash val="solid"/>
+                      <a:round/>
+                      <a:headEnd type="none" w="med" len="med"/>
+                      <a:tailEnd type="none" w="med" len="med"/>
+                    </a:lnL>
+                    <a:lnR w="6350" cap="flat" cmpd="sng" algn="ctr">
+                      <a:solidFill>
+                        <a:srgbClr val="E0E0E0"/>
+                      </a:solidFill>
+                      <a:prstDash val="solid"/>
+                      <a:round/>
+                      <a:headEnd type="none" w="med" len="med"/>
+                      <a:tailEnd type="none" w="med" len="med"/>
+                    </a:lnR>
+                    <a:lnT w="6350" cap="flat" cmpd="sng" algn="ctr">
+                      <a:solidFill>
+                        <a:srgbClr val="E0E0E0"/>
+                      </a:solidFill>
+                      <a:prstDash val="solid"/>
+                      <a:round/>
+                      <a:headEnd type="none" w="med" len="med"/>
+                      <a:tailEnd type="none" w="med" len="med"/>
+                    </a:lnT>
+                    <a:lnB w="6350" cap="flat" cmpd="sng" algn="ctr">
+                      <a:solidFill>
+                        <a:srgbClr val="E0E0E0"/>
+                      </a:solidFill>
+                      <a:prstDash val="solid"/>
+                      <a:round/>
+                      <a:headEnd type="none" w="med" len="med"/>
+                      <a:tailEnd type="none" w="med" len="med"/>
+                    </a:lnB>
+                    <a:solidFill>
+                      <a:srgbClr val="F7F7F7"/>
+                    </a:solidFill>
+                  </a:tcPr>
+                </a:tc>
+                <a:tc>
+                  <a:txBody>
+                    <a:bodyPr/>
+                    <a:lstStyle/>
+                    <a:p>
+                      <a:pPr algn="l"/>
+                      <a:r>
+                        <a:rPr lang="en-US" sz="1700" dirty="0">
+                          <a:solidFill>
+                            <a:srgbClr val="000000"/>
+                          </a:solidFill>
+                          <a:effectLst/>
+                        </a:rPr>
+                        <a:t>Time : Room</a:t>
+                      </a:r>
+                    </a:p>
+                  </a:txBody>
+                  <a:tcPr marL="15681" marR="15681" marT="15681" marB="15681" anchor="ctr">
+                    <a:lnL w="6350" cap="flat" cmpd="sng" algn="ctr">
+                      <a:solidFill>
+                        <a:srgbClr val="E0E0E0"/>
+                      </a:solidFill>
+                      <a:prstDash val="solid"/>
+                      <a:round/>
+                      <a:headEnd type="none" w="med" len="med"/>
+                      <a:tailEnd type="none" w="med" len="med"/>
+                    </a:lnL>
+                    <a:lnR w="6350" cap="flat" cmpd="sng" algn="ctr">
+                      <a:solidFill>
+                        <a:srgbClr val="E0E0E0"/>
+                      </a:solidFill>
+                      <a:prstDash val="solid"/>
+                      <a:round/>
+                      <a:headEnd type="none" w="med" len="med"/>
+                      <a:tailEnd type="none" w="med" len="med"/>
+                    </a:lnR>
+                    <a:lnT w="6350" cap="flat" cmpd="sng" algn="ctr">
+                      <a:solidFill>
+                        <a:srgbClr val="E0E0E0"/>
+                      </a:solidFill>
+                      <a:prstDash val="solid"/>
+                      <a:round/>
+                      <a:headEnd type="none" w="med" len="med"/>
+                      <a:tailEnd type="none" w="med" len="med"/>
+                    </a:lnT>
+                    <a:lnB w="6350" cap="flat" cmpd="sng" algn="ctr">
+                      <a:solidFill>
+                        <a:srgbClr val="E0E0E0"/>
+                      </a:solidFill>
+                      <a:prstDash val="solid"/>
+                      <a:round/>
+                      <a:headEnd type="none" w="med" len="med"/>
+                      <a:tailEnd type="none" w="med" len="med"/>
+                    </a:lnB>
+                    <a:solidFill>
+                      <a:srgbClr val="F7F7F7"/>
+                    </a:solidFill>
+                  </a:tcPr>
+                </a:tc>
+                <a:extLst>
+                  <a:ext uri="{0D108BD9-81ED-4DB2-BD59-A6C34878D82A}">
+                    <a16:rowId xmlns:a16="http://schemas.microsoft.com/office/drawing/2014/main" val="3967578678"/>
+                  </a:ext>
+                </a:extLst>
+              </a:tr>
+              <a:tr h="548296">
+                <a:tc>
+                  <a:txBody>
+                    <a:bodyPr/>
+                    <a:lstStyle/>
+                    <a:p>
+                      <a:r>
+                        <a:rPr lang="en-US" sz="1700">
+                          <a:effectLst/>
+                        </a:rPr>
+                        <a:t>Monday</a:t>
+                      </a:r>
+                    </a:p>
+                  </a:txBody>
+                  <a:tcPr marL="15681" marR="15681" marT="15681" marB="15681" anchor="ctr">
+                    <a:lnL w="6350" cap="flat" cmpd="sng" algn="ctr">
+                      <a:solidFill>
+                        <a:srgbClr val="E0E0E0"/>
+                      </a:solidFill>
+                      <a:prstDash val="solid"/>
+                      <a:round/>
+                      <a:headEnd type="none" w="med" len="med"/>
+                      <a:tailEnd type="none" w="med" len="med"/>
+                    </a:lnL>
+                    <a:lnR w="6350" cap="flat" cmpd="sng" algn="ctr">
+                      <a:solidFill>
+                        <a:srgbClr val="E0E0E0"/>
+                      </a:solidFill>
+                      <a:prstDash val="solid"/>
+                      <a:round/>
+                      <a:headEnd type="none" w="med" len="med"/>
+                      <a:tailEnd type="none" w="med" len="med"/>
+                    </a:lnR>
+                    <a:lnT w="6350" cap="flat" cmpd="sng" algn="ctr">
+                      <a:solidFill>
+                        <a:srgbClr val="E0E0E0"/>
+                      </a:solidFill>
+                      <a:prstDash val="solid"/>
+                      <a:round/>
+                      <a:headEnd type="none" w="med" len="med"/>
+                      <a:tailEnd type="none" w="med" len="med"/>
+                    </a:lnT>
+                    <a:lnB w="6350" cap="flat" cmpd="sng" algn="ctr">
+                      <a:solidFill>
+                        <a:srgbClr val="E0E0E0"/>
+                      </a:solidFill>
+                      <a:prstDash val="solid"/>
+                      <a:round/>
+                      <a:headEnd type="none" w="med" len="med"/>
+                      <a:tailEnd type="none" w="med" len="med"/>
+                    </a:lnB>
+                    <a:solidFill>
+                      <a:srgbClr val="FFFFFF"/>
+                    </a:solidFill>
+                  </a:tcPr>
+                </a:tc>
+                <a:tc>
+                  <a:txBody>
+                    <a:bodyPr/>
+                    <a:lstStyle/>
+                    <a:p>
+                      <a:r>
+                        <a:rPr lang="en-US" sz="1700">
+                          <a:effectLst/>
+                        </a:rPr>
+                        <a:t>12 PM - 2 PM : CSB 120</a:t>
+                      </a:r>
+                    </a:p>
+                  </a:txBody>
+                  <a:tcPr marL="15681" marR="15681" marT="15681" marB="15681" anchor="ctr">
+                    <a:lnL w="6350" cap="flat" cmpd="sng" algn="ctr">
+                      <a:solidFill>
+                        <a:srgbClr val="E0E0E0"/>
+                      </a:solidFill>
+                      <a:prstDash val="solid"/>
+                      <a:round/>
+                      <a:headEnd type="none" w="med" len="med"/>
+                      <a:tailEnd type="none" w="med" len="med"/>
+                    </a:lnL>
+                    <a:lnR w="6350" cap="flat" cmpd="sng" algn="ctr">
+                      <a:solidFill>
+                        <a:srgbClr val="E0E0E0"/>
+                      </a:solidFill>
+                      <a:prstDash val="solid"/>
+                      <a:round/>
+                      <a:headEnd type="none" w="med" len="med"/>
+                      <a:tailEnd type="none" w="med" len="med"/>
+                    </a:lnR>
+                    <a:lnT w="6350" cap="flat" cmpd="sng" algn="ctr">
+                      <a:solidFill>
+                        <a:srgbClr val="E0E0E0"/>
+                      </a:solidFill>
+                      <a:prstDash val="solid"/>
+                      <a:round/>
+                      <a:headEnd type="none" w="med" len="med"/>
+                      <a:tailEnd type="none" w="med" len="med"/>
+                    </a:lnT>
+                    <a:lnB w="6350" cap="flat" cmpd="sng" algn="ctr">
+                      <a:solidFill>
+                        <a:srgbClr val="E0E0E0"/>
+                      </a:solidFill>
+                      <a:prstDash val="solid"/>
+                      <a:round/>
+                      <a:headEnd type="none" w="med" len="med"/>
+                      <a:tailEnd type="none" w="med" len="med"/>
+                    </a:lnB>
+                    <a:solidFill>
+                      <a:srgbClr val="FFFFFF"/>
+                    </a:solidFill>
+                  </a:tcPr>
+                </a:tc>
+                <a:extLst>
+                  <a:ext uri="{0D108BD9-81ED-4DB2-BD59-A6C34878D82A}">
+                    <a16:rowId xmlns:a16="http://schemas.microsoft.com/office/drawing/2014/main" val="4272848274"/>
+                  </a:ext>
+                </a:extLst>
+              </a:tr>
+              <a:tr h="289830">
+                <a:tc>
+                  <a:txBody>
+                    <a:bodyPr/>
+                    <a:lstStyle/>
+                    <a:p>
+                      <a:r>
+                        <a:rPr lang="en-US" sz="1700">
+                          <a:effectLst/>
+                        </a:rPr>
+                        <a:t>Tuesday</a:t>
+                      </a:r>
+                    </a:p>
+                  </a:txBody>
+                  <a:tcPr marL="15681" marR="15681" marT="15681" marB="15681" anchor="ctr">
+                    <a:lnL w="6350" cap="flat" cmpd="sng" algn="ctr">
+                      <a:solidFill>
+                        <a:srgbClr val="E0E0E0"/>
+                      </a:solidFill>
+                      <a:prstDash val="solid"/>
+                      <a:round/>
+                      <a:headEnd type="none" w="med" len="med"/>
+                      <a:tailEnd type="none" w="med" len="med"/>
+                    </a:lnL>
+                    <a:lnR w="6350" cap="flat" cmpd="sng" algn="ctr">
+                      <a:solidFill>
+                        <a:srgbClr val="E0E0E0"/>
+                      </a:solidFill>
+                      <a:prstDash val="solid"/>
+                      <a:round/>
+                      <a:headEnd type="none" w="med" len="med"/>
+                      <a:tailEnd type="none" w="med" len="med"/>
+                    </a:lnR>
+                    <a:lnT w="6350" cap="flat" cmpd="sng" algn="ctr">
+                      <a:solidFill>
+                        <a:srgbClr val="E0E0E0"/>
+                      </a:solidFill>
+                      <a:prstDash val="solid"/>
+                      <a:round/>
+                      <a:headEnd type="none" w="med" len="med"/>
+                      <a:tailEnd type="none" w="med" len="med"/>
+                    </a:lnT>
+                    <a:lnB w="6350" cap="flat" cmpd="sng" algn="ctr">
+                      <a:solidFill>
+                        <a:srgbClr val="E0E0E0"/>
+                      </a:solidFill>
+                      <a:prstDash val="solid"/>
+                      <a:round/>
+                      <a:headEnd type="none" w="med" len="med"/>
+                      <a:tailEnd type="none" w="med" len="med"/>
+                    </a:lnB>
+                    <a:solidFill>
+                      <a:srgbClr val="FFFFFF"/>
+                    </a:solidFill>
+                  </a:tcPr>
+                </a:tc>
+                <a:tc>
+                  <a:txBody>
+                    <a:bodyPr/>
+                    <a:lstStyle/>
+                    <a:p>
+                      <a:r>
+                        <a:rPr lang="en-US" sz="1700">
+                          <a:effectLst/>
+                        </a:rPr>
+                        <a:t>6 PM - 8 PM : Teams</a:t>
+                      </a:r>
+                    </a:p>
+                  </a:txBody>
+                  <a:tcPr marL="15681" marR="15681" marT="15681" marB="15681" anchor="ctr">
+                    <a:lnL w="6350" cap="flat" cmpd="sng" algn="ctr">
+                      <a:solidFill>
+                        <a:srgbClr val="E0E0E0"/>
+                      </a:solidFill>
+                      <a:prstDash val="solid"/>
+                      <a:round/>
+                      <a:headEnd type="none" w="med" len="med"/>
+                      <a:tailEnd type="none" w="med" len="med"/>
+                    </a:lnL>
+                    <a:lnR w="6350" cap="flat" cmpd="sng" algn="ctr">
+                      <a:solidFill>
+                        <a:srgbClr val="E0E0E0"/>
+                      </a:solidFill>
+                      <a:prstDash val="solid"/>
+                      <a:round/>
+                      <a:headEnd type="none" w="med" len="med"/>
+                      <a:tailEnd type="none" w="med" len="med"/>
+                    </a:lnR>
+                    <a:lnT w="6350" cap="flat" cmpd="sng" algn="ctr">
+                      <a:solidFill>
+                        <a:srgbClr val="E0E0E0"/>
+                      </a:solidFill>
+                      <a:prstDash val="solid"/>
+                      <a:round/>
+                      <a:headEnd type="none" w="med" len="med"/>
+                      <a:tailEnd type="none" w="med" len="med"/>
+                    </a:lnT>
+                    <a:lnB w="6350" cap="flat" cmpd="sng" algn="ctr">
+                      <a:solidFill>
+                        <a:srgbClr val="E0E0E0"/>
+                      </a:solidFill>
+                      <a:prstDash val="solid"/>
+                      <a:round/>
+                      <a:headEnd type="none" w="med" len="med"/>
+                      <a:tailEnd type="none" w="med" len="med"/>
+                    </a:lnB>
+                    <a:solidFill>
+                      <a:srgbClr val="FFFFFF"/>
+                    </a:solidFill>
+                  </a:tcPr>
+                </a:tc>
+                <a:extLst>
+                  <a:ext uri="{0D108BD9-81ED-4DB2-BD59-A6C34878D82A}">
+                    <a16:rowId xmlns:a16="http://schemas.microsoft.com/office/drawing/2014/main" val="369786881"/>
+                  </a:ext>
+                </a:extLst>
+              </a:tr>
+              <a:tr h="548296">
+                <a:tc>
+                  <a:txBody>
+                    <a:bodyPr/>
+                    <a:lstStyle/>
+                    <a:p>
+                      <a:r>
+                        <a:rPr lang="en-US" sz="1700">
+                          <a:effectLst/>
+                        </a:rPr>
+                        <a:t>Wednesday</a:t>
+                      </a:r>
+                    </a:p>
+                  </a:txBody>
+                  <a:tcPr marL="15681" marR="15681" marT="15681" marB="15681" anchor="ctr">
+                    <a:lnL w="6350" cap="flat" cmpd="sng" algn="ctr">
+                      <a:solidFill>
+                        <a:srgbClr val="E0E0E0"/>
+                      </a:solidFill>
+                      <a:prstDash val="solid"/>
+                      <a:round/>
+                      <a:headEnd type="none" w="med" len="med"/>
+                      <a:tailEnd type="none" w="med" len="med"/>
+                    </a:lnL>
+                    <a:lnR w="6350" cap="flat" cmpd="sng" algn="ctr">
+                      <a:solidFill>
+                        <a:srgbClr val="E0E0E0"/>
+                      </a:solidFill>
+                      <a:prstDash val="solid"/>
+                      <a:round/>
+                      <a:headEnd type="none" w="med" len="med"/>
+                      <a:tailEnd type="none" w="med" len="med"/>
+                    </a:lnR>
+                    <a:lnT w="6350" cap="flat" cmpd="sng" algn="ctr">
+                      <a:solidFill>
+                        <a:srgbClr val="E0E0E0"/>
+                      </a:solidFill>
+                      <a:prstDash val="solid"/>
+                      <a:round/>
+                      <a:headEnd type="none" w="med" len="med"/>
+                      <a:tailEnd type="none" w="med" len="med"/>
+                    </a:lnT>
+                    <a:lnB w="6350" cap="flat" cmpd="sng" algn="ctr">
+                      <a:solidFill>
+                        <a:srgbClr val="E0E0E0"/>
+                      </a:solidFill>
+                      <a:prstDash val="solid"/>
+                      <a:round/>
+                      <a:headEnd type="none" w="med" len="med"/>
+                      <a:tailEnd type="none" w="med" len="med"/>
+                    </a:lnB>
+                    <a:solidFill>
+                      <a:srgbClr val="FFFFFF"/>
+                    </a:solidFill>
+                  </a:tcPr>
+                </a:tc>
+                <a:tc>
+                  <a:txBody>
+                    <a:bodyPr/>
+                    <a:lstStyle/>
+                    <a:p>
+                      <a:r>
+                        <a:rPr lang="en-US" sz="1700">
+                          <a:effectLst/>
+                        </a:rPr>
+                        <a:t>3 PM - 5 PM : CSB 120</a:t>
+                      </a:r>
+                    </a:p>
+                  </a:txBody>
+                  <a:tcPr marL="15681" marR="15681" marT="15681" marB="15681" anchor="ctr">
+                    <a:lnL w="6350" cap="flat" cmpd="sng" algn="ctr">
+                      <a:solidFill>
+                        <a:srgbClr val="E0E0E0"/>
+                      </a:solidFill>
+                      <a:prstDash val="solid"/>
+                      <a:round/>
+                      <a:headEnd type="none" w="med" len="med"/>
+                      <a:tailEnd type="none" w="med" len="med"/>
+                    </a:lnL>
+                    <a:lnR w="6350" cap="flat" cmpd="sng" algn="ctr">
+                      <a:solidFill>
+                        <a:srgbClr val="E0E0E0"/>
+                      </a:solidFill>
+                      <a:prstDash val="solid"/>
+                      <a:round/>
+                      <a:headEnd type="none" w="med" len="med"/>
+                      <a:tailEnd type="none" w="med" len="med"/>
+                    </a:lnR>
+                    <a:lnT w="6350" cap="flat" cmpd="sng" algn="ctr">
+                      <a:solidFill>
+                        <a:srgbClr val="E0E0E0"/>
+                      </a:solidFill>
+                      <a:prstDash val="solid"/>
+                      <a:round/>
+                      <a:headEnd type="none" w="med" len="med"/>
+                      <a:tailEnd type="none" w="med" len="med"/>
+                    </a:lnT>
+                    <a:lnB w="6350" cap="flat" cmpd="sng" algn="ctr">
+                      <a:solidFill>
+                        <a:srgbClr val="E0E0E0"/>
+                      </a:solidFill>
+                      <a:prstDash val="solid"/>
+                      <a:round/>
+                      <a:headEnd type="none" w="med" len="med"/>
+                      <a:tailEnd type="none" w="med" len="med"/>
+                    </a:lnB>
+                    <a:solidFill>
+                      <a:srgbClr val="FFFFFF"/>
+                    </a:solidFill>
+                  </a:tcPr>
+                </a:tc>
+                <a:extLst>
+                  <a:ext uri="{0D108BD9-81ED-4DB2-BD59-A6C34878D82A}">
+                    <a16:rowId xmlns:a16="http://schemas.microsoft.com/office/drawing/2014/main" val="252902362"/>
+                  </a:ext>
+                </a:extLst>
+              </a:tr>
+              <a:tr h="289830">
+                <a:tc>
+                  <a:txBody>
+                    <a:bodyPr/>
+                    <a:lstStyle/>
+                    <a:p>
+                      <a:r>
+                        <a:rPr lang="en-US" sz="1700">
+                          <a:effectLst/>
+                        </a:rPr>
+                        <a:t>Thursday</a:t>
+                      </a:r>
+                    </a:p>
+                  </a:txBody>
+                  <a:tcPr marL="15681" marR="15681" marT="15681" marB="15681" anchor="ctr">
+                    <a:lnL w="6350" cap="flat" cmpd="sng" algn="ctr">
+                      <a:solidFill>
+                        <a:srgbClr val="E0E0E0"/>
+                      </a:solidFill>
+                      <a:prstDash val="solid"/>
+                      <a:round/>
+                      <a:headEnd type="none" w="med" len="med"/>
+                      <a:tailEnd type="none" w="med" len="med"/>
+                    </a:lnL>
+                    <a:lnR w="6350" cap="flat" cmpd="sng" algn="ctr">
+                      <a:solidFill>
+                        <a:srgbClr val="E0E0E0"/>
+                      </a:solidFill>
+                      <a:prstDash val="solid"/>
+                      <a:round/>
+                      <a:headEnd type="none" w="med" len="med"/>
+                      <a:tailEnd type="none" w="med" len="med"/>
+                    </a:lnR>
+                    <a:lnT w="6350" cap="flat" cmpd="sng" algn="ctr">
+                      <a:solidFill>
+                        <a:srgbClr val="E0E0E0"/>
+                      </a:solidFill>
+                      <a:prstDash val="solid"/>
+                      <a:round/>
+                      <a:headEnd type="none" w="med" len="med"/>
+                      <a:tailEnd type="none" w="med" len="med"/>
+                    </a:lnT>
+                    <a:lnB w="6350" cap="flat" cmpd="sng" algn="ctr">
+                      <a:solidFill>
+                        <a:srgbClr val="E0E0E0"/>
+                      </a:solidFill>
+                      <a:prstDash val="solid"/>
+                      <a:round/>
+                      <a:headEnd type="none" w="med" len="med"/>
+                      <a:tailEnd type="none" w="med" len="med"/>
+                    </a:lnB>
+                    <a:solidFill>
+                      <a:srgbClr val="FFFFFF"/>
+                    </a:solidFill>
+                  </a:tcPr>
+                </a:tc>
+                <a:tc>
+                  <a:txBody>
+                    <a:bodyPr/>
+                    <a:lstStyle/>
+                    <a:p>
+                      <a:r>
+                        <a:rPr lang="en-US" sz="1700">
+                          <a:effectLst/>
+                        </a:rPr>
+                        <a:t>6 PM - 8 PM : Teams</a:t>
+                      </a:r>
+                    </a:p>
+                  </a:txBody>
+                  <a:tcPr marL="15681" marR="15681" marT="15681" marB="15681" anchor="ctr">
+                    <a:lnL w="6350" cap="flat" cmpd="sng" algn="ctr">
+                      <a:solidFill>
+                        <a:srgbClr val="E0E0E0"/>
+                      </a:solidFill>
+                      <a:prstDash val="solid"/>
+                      <a:round/>
+                      <a:headEnd type="none" w="med" len="med"/>
+                      <a:tailEnd type="none" w="med" len="med"/>
+                    </a:lnL>
+                    <a:lnR w="6350" cap="flat" cmpd="sng" algn="ctr">
+                      <a:solidFill>
+                        <a:srgbClr val="E0E0E0"/>
+                      </a:solidFill>
+                      <a:prstDash val="solid"/>
+                      <a:round/>
+                      <a:headEnd type="none" w="med" len="med"/>
+                      <a:tailEnd type="none" w="med" len="med"/>
+                    </a:lnR>
+                    <a:lnT w="6350" cap="flat" cmpd="sng" algn="ctr">
+                      <a:solidFill>
+                        <a:srgbClr val="E0E0E0"/>
+                      </a:solidFill>
+                      <a:prstDash val="solid"/>
+                      <a:round/>
+                      <a:headEnd type="none" w="med" len="med"/>
+                      <a:tailEnd type="none" w="med" len="med"/>
+                    </a:lnT>
+                    <a:lnB w="6350" cap="flat" cmpd="sng" algn="ctr">
+                      <a:solidFill>
+                        <a:srgbClr val="E0E0E0"/>
+                      </a:solidFill>
+                      <a:prstDash val="solid"/>
+                      <a:round/>
+                      <a:headEnd type="none" w="med" len="med"/>
+                      <a:tailEnd type="none" w="med" len="med"/>
+                    </a:lnB>
+                    <a:solidFill>
+                      <a:srgbClr val="FFFFFF"/>
+                    </a:solidFill>
+                  </a:tcPr>
+                </a:tc>
+                <a:extLst>
+                  <a:ext uri="{0D108BD9-81ED-4DB2-BD59-A6C34878D82A}">
+                    <a16:rowId xmlns:a16="http://schemas.microsoft.com/office/drawing/2014/main" val="2125508035"/>
+                  </a:ext>
+                </a:extLst>
+              </a:tr>
+              <a:tr h="548296">
+                <a:tc>
+                  <a:txBody>
+                    <a:bodyPr/>
+                    <a:lstStyle/>
+                    <a:p>
+                      <a:r>
+                        <a:rPr lang="en-US" sz="1700">
+                          <a:effectLst/>
+                        </a:rPr>
+                        <a:t>Friday</a:t>
+                      </a:r>
+                    </a:p>
+                  </a:txBody>
+                  <a:tcPr marL="15681" marR="15681" marT="15681" marB="15681" anchor="ctr">
+                    <a:lnL w="6350" cap="flat" cmpd="sng" algn="ctr">
+                      <a:solidFill>
+                        <a:srgbClr val="E0E0E0"/>
+                      </a:solidFill>
+                      <a:prstDash val="solid"/>
+                      <a:round/>
+                      <a:headEnd type="none" w="med" len="med"/>
+                      <a:tailEnd type="none" w="med" len="med"/>
+                    </a:lnL>
+                    <a:lnR w="6350" cap="flat" cmpd="sng" algn="ctr">
+                      <a:solidFill>
+                        <a:srgbClr val="E0E0E0"/>
+                      </a:solidFill>
+                      <a:prstDash val="solid"/>
+                      <a:round/>
+                      <a:headEnd type="none" w="med" len="med"/>
+                      <a:tailEnd type="none" w="med" len="med"/>
+                    </a:lnR>
+                    <a:lnT w="6350" cap="flat" cmpd="sng" algn="ctr">
+                      <a:solidFill>
+                        <a:srgbClr val="E0E0E0"/>
+                      </a:solidFill>
+                      <a:prstDash val="solid"/>
+                      <a:round/>
+                      <a:headEnd type="none" w="med" len="med"/>
+                      <a:tailEnd type="none" w="med" len="med"/>
+                    </a:lnT>
+                    <a:lnB w="6350" cap="flat" cmpd="sng" algn="ctr">
+                      <a:solidFill>
+                        <a:srgbClr val="E0E0E0"/>
+                      </a:solidFill>
+                      <a:prstDash val="solid"/>
+                      <a:round/>
+                      <a:headEnd type="none" w="med" len="med"/>
+                      <a:tailEnd type="none" w="med" len="med"/>
+                    </a:lnB>
+                    <a:solidFill>
+                      <a:srgbClr val="FFFFFF"/>
+                    </a:solidFill>
+                  </a:tcPr>
+                </a:tc>
+                <a:tc>
+                  <a:txBody>
+                    <a:bodyPr/>
+                    <a:lstStyle/>
+                    <a:p>
+                      <a:r>
+                        <a:rPr lang="en-US" sz="1700">
+                          <a:effectLst/>
+                        </a:rPr>
+                        <a:t>3 PM - 5 PM : CSB 120</a:t>
+                      </a:r>
+                    </a:p>
+                  </a:txBody>
+                  <a:tcPr marL="15681" marR="15681" marT="15681" marB="15681" anchor="ctr">
+                    <a:lnL w="6350" cap="flat" cmpd="sng" algn="ctr">
+                      <a:solidFill>
+                        <a:srgbClr val="E0E0E0"/>
+                      </a:solidFill>
+                      <a:prstDash val="solid"/>
+                      <a:round/>
+                      <a:headEnd type="none" w="med" len="med"/>
+                      <a:tailEnd type="none" w="med" len="med"/>
+                    </a:lnL>
+                    <a:lnR w="6350" cap="flat" cmpd="sng" algn="ctr">
+                      <a:solidFill>
+                        <a:srgbClr val="E0E0E0"/>
+                      </a:solidFill>
+                      <a:prstDash val="solid"/>
+                      <a:round/>
+                      <a:headEnd type="none" w="med" len="med"/>
+                      <a:tailEnd type="none" w="med" len="med"/>
+                    </a:lnR>
+                    <a:lnT w="6350" cap="flat" cmpd="sng" algn="ctr">
+                      <a:solidFill>
+                        <a:srgbClr val="E0E0E0"/>
+                      </a:solidFill>
+                      <a:prstDash val="solid"/>
+                      <a:round/>
+                      <a:headEnd type="none" w="med" len="med"/>
+                      <a:tailEnd type="none" w="med" len="med"/>
+                    </a:lnT>
+                    <a:lnB w="6350" cap="flat" cmpd="sng" algn="ctr">
+                      <a:solidFill>
+                        <a:srgbClr val="E0E0E0"/>
+                      </a:solidFill>
+                      <a:prstDash val="solid"/>
+                      <a:round/>
+                      <a:headEnd type="none" w="med" len="med"/>
+                      <a:tailEnd type="none" w="med" len="med"/>
+                    </a:lnB>
+                    <a:solidFill>
+                      <a:srgbClr val="FFFFFF"/>
+                    </a:solidFill>
+                  </a:tcPr>
+                </a:tc>
+                <a:extLst>
+                  <a:ext uri="{0D108BD9-81ED-4DB2-BD59-A6C34878D82A}">
+                    <a16:rowId xmlns:a16="http://schemas.microsoft.com/office/drawing/2014/main" val="772220127"/>
+                  </a:ext>
+                </a:extLst>
+              </a:tr>
+              <a:tr h="289830">
+                <a:tc>
+                  <a:txBody>
+                    <a:bodyPr/>
+                    <a:lstStyle/>
+                    <a:p>
+                      <a:r>
+                        <a:rPr lang="en-US" sz="1700">
+                          <a:effectLst/>
+                        </a:rPr>
+                        <a:t>Saturday</a:t>
+                      </a:r>
+                    </a:p>
+                  </a:txBody>
+                  <a:tcPr marL="15681" marR="15681" marT="15681" marB="15681" anchor="ctr">
+                    <a:lnL w="6350" cap="flat" cmpd="sng" algn="ctr">
+                      <a:solidFill>
+                        <a:srgbClr val="E0E0E0"/>
+                      </a:solidFill>
+                      <a:prstDash val="solid"/>
+                      <a:round/>
+                      <a:headEnd type="none" w="med" len="med"/>
+                      <a:tailEnd type="none" w="med" len="med"/>
+                    </a:lnL>
+                    <a:lnR w="6350" cap="flat" cmpd="sng" algn="ctr">
+                      <a:solidFill>
+                        <a:srgbClr val="E0E0E0"/>
+                      </a:solidFill>
+                      <a:prstDash val="solid"/>
+                      <a:round/>
+                      <a:headEnd type="none" w="med" len="med"/>
+                      <a:tailEnd type="none" w="med" len="med"/>
+                    </a:lnR>
+                    <a:lnT w="6350" cap="flat" cmpd="sng" algn="ctr">
+                      <a:solidFill>
+                        <a:srgbClr val="E0E0E0"/>
+                      </a:solidFill>
+                      <a:prstDash val="solid"/>
+                      <a:round/>
+                      <a:headEnd type="none" w="med" len="med"/>
+                      <a:tailEnd type="none" w="med" len="med"/>
+                    </a:lnT>
+                    <a:lnB w="6350" cap="flat" cmpd="sng" algn="ctr">
+                      <a:solidFill>
+                        <a:srgbClr val="E0E0E0"/>
+                      </a:solidFill>
+                      <a:prstDash val="solid"/>
+                      <a:round/>
+                      <a:headEnd type="none" w="med" len="med"/>
+                      <a:tailEnd type="none" w="med" len="med"/>
+                    </a:lnB>
+                    <a:solidFill>
+                      <a:srgbClr val="FFFFFF"/>
+                    </a:solidFill>
+                  </a:tcPr>
+                </a:tc>
+                <a:tc>
+                  <a:txBody>
+                    <a:bodyPr/>
+                    <a:lstStyle/>
+                    <a:p>
+                      <a:r>
+                        <a:rPr lang="en-US" sz="1700">
+                          <a:effectLst/>
+                        </a:rPr>
+                        <a:t>12 PM - 4 PM : Teams</a:t>
+                      </a:r>
+                    </a:p>
+                  </a:txBody>
+                  <a:tcPr marL="15681" marR="15681" marT="15681" marB="15681" anchor="ctr">
+                    <a:lnL w="6350" cap="flat" cmpd="sng" algn="ctr">
+                      <a:solidFill>
+                        <a:srgbClr val="E0E0E0"/>
+                      </a:solidFill>
+                      <a:prstDash val="solid"/>
+                      <a:round/>
+                      <a:headEnd type="none" w="med" len="med"/>
+                      <a:tailEnd type="none" w="med" len="med"/>
+                    </a:lnL>
+                    <a:lnR w="6350" cap="flat" cmpd="sng" algn="ctr">
+                      <a:solidFill>
+                        <a:srgbClr val="E0E0E0"/>
+                      </a:solidFill>
+                      <a:prstDash val="solid"/>
+                      <a:round/>
+                      <a:headEnd type="none" w="med" len="med"/>
+                      <a:tailEnd type="none" w="med" len="med"/>
+                    </a:lnR>
+                    <a:lnT w="6350" cap="flat" cmpd="sng" algn="ctr">
+                      <a:solidFill>
+                        <a:srgbClr val="E0E0E0"/>
+                      </a:solidFill>
+                      <a:prstDash val="solid"/>
+                      <a:round/>
+                      <a:headEnd type="none" w="med" len="med"/>
+                      <a:tailEnd type="none" w="med" len="med"/>
+                    </a:lnT>
+                    <a:lnB w="6350" cap="flat" cmpd="sng" algn="ctr">
+                      <a:solidFill>
+                        <a:srgbClr val="E0E0E0"/>
+                      </a:solidFill>
+                      <a:prstDash val="solid"/>
+                      <a:round/>
+                      <a:headEnd type="none" w="med" len="med"/>
+                      <a:tailEnd type="none" w="med" len="med"/>
+                    </a:lnB>
+                    <a:solidFill>
+                      <a:srgbClr val="FFFFFF"/>
+                    </a:solidFill>
+                  </a:tcPr>
+                </a:tc>
+                <a:extLst>
+                  <a:ext uri="{0D108BD9-81ED-4DB2-BD59-A6C34878D82A}">
+                    <a16:rowId xmlns:a16="http://schemas.microsoft.com/office/drawing/2014/main" val="3754499503"/>
+                  </a:ext>
+                </a:extLst>
+              </a:tr>
+              <a:tr h="289830">
+                <a:tc>
+                  <a:txBody>
+                    <a:bodyPr/>
+                    <a:lstStyle/>
+                    <a:p>
+                      <a:r>
+                        <a:rPr lang="en-US" sz="1700">
+                          <a:effectLst/>
+                        </a:rPr>
+                        <a:t>Sunday</a:t>
+                      </a:r>
+                    </a:p>
+                  </a:txBody>
+                  <a:tcPr marL="15681" marR="15681" marT="15681" marB="15681" anchor="ctr">
+                    <a:lnL w="6350" cap="flat" cmpd="sng" algn="ctr">
+                      <a:solidFill>
+                        <a:srgbClr val="E0E0E0"/>
+                      </a:solidFill>
+                      <a:prstDash val="solid"/>
+                      <a:round/>
+                      <a:headEnd type="none" w="med" len="med"/>
+                      <a:tailEnd type="none" w="med" len="med"/>
+                    </a:lnL>
+                    <a:lnR w="6350" cap="flat" cmpd="sng" algn="ctr">
+                      <a:solidFill>
+                        <a:srgbClr val="E0E0E0"/>
+                      </a:solidFill>
+                      <a:prstDash val="solid"/>
+                      <a:round/>
+                      <a:headEnd type="none" w="med" len="med"/>
+                      <a:tailEnd type="none" w="med" len="med"/>
+                    </a:lnR>
+                    <a:lnT w="6350" cap="flat" cmpd="sng" algn="ctr">
+                      <a:solidFill>
+                        <a:srgbClr val="E0E0E0"/>
+                      </a:solidFill>
+                      <a:prstDash val="solid"/>
+                      <a:round/>
+                      <a:headEnd type="none" w="med" len="med"/>
+                      <a:tailEnd type="none" w="med" len="med"/>
+                    </a:lnT>
+                    <a:lnB w="6350" cap="flat" cmpd="sng" algn="ctr">
+                      <a:solidFill>
+                        <a:srgbClr val="E0E0E0"/>
+                      </a:solidFill>
+                      <a:prstDash val="solid"/>
+                      <a:round/>
+                      <a:headEnd type="none" w="med" len="med"/>
+                      <a:tailEnd type="none" w="med" len="med"/>
+                    </a:lnB>
+                    <a:solidFill>
+                      <a:srgbClr val="FFFFFF"/>
+                    </a:solidFill>
+                  </a:tcPr>
+                </a:tc>
+                <a:tc>
+                  <a:txBody>
+                    <a:bodyPr/>
+                    <a:lstStyle/>
+                    <a:p>
+                      <a:r>
+                        <a:rPr lang="en-US" sz="1700" dirty="0">
+                          <a:effectLst/>
+                        </a:rPr>
+                        <a:t>12 PM - 4 PM : Teams</a:t>
+                      </a:r>
+                    </a:p>
+                  </a:txBody>
+                  <a:tcPr marL="15681" marR="15681" marT="15681" marB="15681" anchor="ctr">
+                    <a:lnL w="6350" cap="flat" cmpd="sng" algn="ctr">
+                      <a:solidFill>
+                        <a:srgbClr val="E0E0E0"/>
+                      </a:solidFill>
+                      <a:prstDash val="solid"/>
+                      <a:round/>
+                      <a:headEnd type="none" w="med" len="med"/>
+                      <a:tailEnd type="none" w="med" len="med"/>
+                    </a:lnL>
+                    <a:lnR w="6350" cap="flat" cmpd="sng" algn="ctr">
+                      <a:solidFill>
+                        <a:srgbClr val="E0E0E0"/>
+                      </a:solidFill>
+                      <a:prstDash val="solid"/>
+                      <a:round/>
+                      <a:headEnd type="none" w="med" len="med"/>
+                      <a:tailEnd type="none" w="med" len="med"/>
+                    </a:lnR>
+                    <a:lnT w="6350" cap="flat" cmpd="sng" algn="ctr">
+                      <a:solidFill>
+                        <a:srgbClr val="E0E0E0"/>
+                      </a:solidFill>
+                      <a:prstDash val="solid"/>
+                      <a:round/>
+                      <a:headEnd type="none" w="med" len="med"/>
+                      <a:tailEnd type="none" w="med" len="med"/>
+                    </a:lnT>
+                    <a:lnB w="6350" cap="flat" cmpd="sng" algn="ctr">
+                      <a:solidFill>
+                        <a:srgbClr val="E0E0E0"/>
+                      </a:solidFill>
+                      <a:prstDash val="solid"/>
+                      <a:round/>
+                      <a:headEnd type="none" w="med" len="med"/>
+                      <a:tailEnd type="none" w="med" len="med"/>
+                    </a:lnB>
+                    <a:solidFill>
+                      <a:srgbClr val="FFFFFF"/>
+                    </a:solidFill>
+                  </a:tcPr>
+                </a:tc>
+                <a:extLst>
+                  <a:ext uri="{0D108BD9-81ED-4DB2-BD59-A6C34878D82A}">
+                    <a16:rowId xmlns:a16="http://schemas.microsoft.com/office/drawing/2014/main" val="1778919050"/>
+                  </a:ext>
+                </a:extLst>
+              </a:tr>
+            </a:tbl>
+          </a:graphicData>
+        </a:graphic>
+      </p:graphicFrame>
+      <p:sp>
+        <p:nvSpPr>
+          <p:cNvPr id="5" name="TextBox 4">
+            <a:extLst>
+              <a:ext uri="{FF2B5EF4-FFF2-40B4-BE49-F238E27FC236}">
+                <a16:creationId xmlns:a16="http://schemas.microsoft.com/office/drawing/2014/main" id="{24E59D90-8018-493E-AFF9-3C08F4AFF82A}"/>
+              </a:ext>
+            </a:extLst>
+          </p:cNvPr>
+          <p:cNvSpPr txBox="1"/>
+          <p:nvPr/>
+        </p:nvSpPr>
+        <p:spPr>
+          <a:xfrm flipH="1">
+            <a:off x="9976198" y="3363522"/>
+            <a:ext cx="2444933" cy="400110"/>
+          </a:xfrm>
+          <a:prstGeom prst="rect">
+            <a:avLst/>
+          </a:prstGeom>
+          <a:noFill/>
+        </p:spPr>
+        <p:txBody>
+          <a:bodyPr wrap="square" rtlCol="0">
+            <a:spAutoFit/>
+          </a:bodyPr>
+          <a:lstStyle/>
+          <a:p>
+            <a:r>
+              <a:rPr lang="en-US" dirty="0"/>
+              <a:t>Help Desk</a:t>
+            </a:r>
+          </a:p>
+        </p:txBody>
+      </p:sp>
     </p:spTree>
     <p:extLst>
       <p:ext uri="{BB962C8B-B14F-4D97-AF65-F5344CB8AC3E}">
@@ -13173,12 +13609,21 @@
         <p:spPr>
           <a:xfrm>
             <a:off x="410359" y="1891134"/>
-            <a:ext cx="12659425" cy="1023422"/>
+            <a:ext cx="12659425" cy="2660793"/>
           </a:xfrm>
         </p:spPr>
         <p:txBody>
           <a:bodyPr/>
           <a:lstStyle/>
+          <a:p>
+            <a:r>
+              <a:rPr lang="en-US" sz="2400" b="1" dirty="0"/>
+              <a:t>Grab a paper, write your name, as it is in Canvas, and your answers to the following questions. Turn this as your attendance for today’s lecture.</a:t>
+            </a:r>
+          </a:p>
+          <a:p>
+            <a:endParaRPr lang="en-US" sz="2400" dirty="0"/>
+          </a:p>
           <a:p>
             <a:r>
               <a:rPr lang="en-US" sz="2400" dirty="0"/>
@@ -25782,16 +26227,16 @@
 <file path=customXml/itemProps3.xml><?xml version="1.0" encoding="utf-8"?>
 <ds:datastoreItem xmlns:ds="http://schemas.openxmlformats.org/officeDocument/2006/customXml" ds:itemID="{79148DBB-E3F1-4A84-AF7D-28B80FBFDF09}">
   <ds:schemaRefs>
+    <ds:schemaRef ds:uri="http://schemas.microsoft.com/office/2006/documentManagement/types"/>
     <ds:schemaRef ds:uri="http://schemas.openxmlformats.org/package/2006/metadata/core-properties"/>
+    <ds:schemaRef ds:uri="http://www.w3.org/XML/1998/namespace"/>
+    <ds:schemaRef ds:uri="e06ed288-fd75-4b50-bbed-f5a5df88c31c"/>
     <ds:schemaRef ds:uri="http://purl.org/dc/dcmitype/"/>
+    <ds:schemaRef ds:uri="92c41bee-f0ee-4aa6-9399-a35fbb883510"/>
+    <ds:schemaRef ds:uri="http://purl.org/dc/elements/1.1/"/>
+    <ds:schemaRef ds:uri="http://schemas.microsoft.com/office/infopath/2007/PartnerControls"/>
     <ds:schemaRef ds:uri="http://schemas.microsoft.com/office/2006/metadata/properties"/>
-    <ds:schemaRef ds:uri="http://schemas.microsoft.com/office/infopath/2007/PartnerControls"/>
-    <ds:schemaRef ds:uri="e06ed288-fd75-4b50-bbed-f5a5df88c31c"/>
-    <ds:schemaRef ds:uri="http://schemas.microsoft.com/office/2006/documentManagement/types"/>
-    <ds:schemaRef ds:uri="http://www.w3.org/XML/1998/namespace"/>
-    <ds:schemaRef ds:uri="92c41bee-f0ee-4aa6-9399-a35fbb883510"/>
     <ds:schemaRef ds:uri="http://purl.org/dc/terms/"/>
-    <ds:schemaRef ds:uri="http://purl.org/dc/elements/1.1/"/>
   </ds:schemaRefs>
 </ds:datastoreItem>
 </file>
</xml_diff>

<commit_message>
String manipulation lecture updated
</commit_message>
<xml_diff>
--- a/slides/On-Campus/06_03_StringManipulation.pptx
+++ b/slides/On-Campus/06_03_StringManipulation.pptx
@@ -152,1071 +152,33 @@
   </pc:docChgLst>
   <pc:docChgLst>
     <pc:chgData name="Marcia Moraes" userId="c9c67e8a-58e2-4733-9a1c-5d44fec4775b" providerId="ADAL" clId="{F9CDF985-13F2-499A-8A55-943F22618C3C}"/>
-    <pc:docChg chg="undo redo custSel addSld delSld modSld sldOrd">
-      <pc:chgData name="Marcia Moraes" userId="c9c67e8a-58e2-4733-9a1c-5d44fec4775b" providerId="ADAL" clId="{F9CDF985-13F2-499A-8A55-943F22618C3C}" dt="2023-09-26T22:06:42.612" v="6636"/>
+  </pc:docChgLst>
+  <pc:docChgLst>
+    <pc:chgData name="Marcia Moraes" userId="c9c67e8a-58e2-4733-9a1c-5d44fec4775b" providerId="ADAL" clId="{EA7127AE-31EC-4AFB-91C6-2A0169B62BE0}"/>
+  </pc:docChgLst>
+  <pc:docChgLst>
+    <pc:chgData name="Marcia Moraes" userId="c9c67e8a-58e2-4733-9a1c-5d44fec4775b" providerId="ADAL" clId="{9A38EEB2-3541-4D9F-8B2C-BF5F0D2F131E}"/>
+    <pc:docChg chg="modSld">
+      <pc:chgData name="Marcia Moraes" userId="c9c67e8a-58e2-4733-9a1c-5d44fec4775b" providerId="ADAL" clId="{9A38EEB2-3541-4D9F-8B2C-BF5F0D2F131E}" dt="2024-02-16T17:37:48.917" v="2" actId="20577"/>
       <pc:docMkLst>
         <pc:docMk/>
       </pc:docMkLst>
-      <pc:sldChg chg="addSp delSp modSp">
-        <pc:chgData name="Marcia Moraes" userId="c9c67e8a-58e2-4733-9a1c-5d44fec4775b" providerId="ADAL" clId="{F9CDF985-13F2-499A-8A55-943F22618C3C}" dt="2023-09-26T22:06:42.612" v="6636"/>
-        <pc:sldMkLst>
-          <pc:docMk/>
-          <pc:sldMk cId="661209559" sldId="256"/>
-        </pc:sldMkLst>
-        <pc:spChg chg="add del mod">
-          <ac:chgData name="Marcia Moraes" userId="c9c67e8a-58e2-4733-9a1c-5d44fec4775b" providerId="ADAL" clId="{F9CDF985-13F2-499A-8A55-943F22618C3C}" dt="2023-09-26T21:27:49.594" v="6062"/>
-          <ac:spMkLst>
-            <pc:docMk/>
-            <pc:sldMk cId="661209559" sldId="256"/>
-            <ac:spMk id="2" creationId="{3FF911C0-4C99-4A85-8385-95F55A8DF17B}"/>
-          </ac:spMkLst>
-        </pc:spChg>
-        <pc:spChg chg="add del mod">
-          <ac:chgData name="Marcia Moraes" userId="c9c67e8a-58e2-4733-9a1c-5d44fec4775b" providerId="ADAL" clId="{F9CDF985-13F2-499A-8A55-943F22618C3C}" dt="2023-09-26T21:27:55.972" v="6063"/>
-          <ac:spMkLst>
-            <pc:docMk/>
-            <pc:sldMk cId="661209559" sldId="256"/>
-            <ac:spMk id="3" creationId="{4B4ED4CA-9AE4-416D-BAB2-6B401FA219B4}"/>
-          </ac:spMkLst>
-        </pc:spChg>
-        <pc:spChg chg="mod">
-          <ac:chgData name="Marcia Moraes" userId="c9c67e8a-58e2-4733-9a1c-5d44fec4775b" providerId="ADAL" clId="{F9CDF985-13F2-499A-8A55-943F22618C3C}" dt="2023-09-26T22:06:35.479" v="6635" actId="962"/>
-          <ac:spMkLst>
-            <pc:docMk/>
-            <pc:sldMk cId="661209559" sldId="256"/>
-            <ac:spMk id="4" creationId="{36830EDF-82C3-4D4E-8F52-61F2DB42DA11}"/>
-          </ac:spMkLst>
-        </pc:spChg>
-        <pc:spChg chg="del">
-          <ac:chgData name="Marcia Moraes" userId="c9c67e8a-58e2-4733-9a1c-5d44fec4775b" providerId="ADAL" clId="{F9CDF985-13F2-499A-8A55-943F22618C3C}" dt="2023-09-26T21:27:49.594" v="6062"/>
-          <ac:spMkLst>
-            <pc:docMk/>
-            <pc:sldMk cId="661209559" sldId="256"/>
-            <ac:spMk id="5" creationId="{2D277C9B-9163-FB49-9FDB-50914D5C9EE4}"/>
-          </ac:spMkLst>
-        </pc:spChg>
-        <pc:spChg chg="add del mod">
-          <ac:chgData name="Marcia Moraes" userId="c9c67e8a-58e2-4733-9a1c-5d44fec4775b" providerId="ADAL" clId="{F9CDF985-13F2-499A-8A55-943F22618C3C}" dt="2023-09-26T21:25:00.288" v="6033" actId="478"/>
-          <ac:spMkLst>
-            <pc:docMk/>
-            <pc:sldMk cId="661209559" sldId="256"/>
-            <ac:spMk id="6" creationId="{276ACBB4-0AC3-4E06-BE7D-E800317FD2E1}"/>
-          </ac:spMkLst>
-        </pc:spChg>
-        <pc:spChg chg="add del mod">
-          <ac:chgData name="Marcia Moraes" userId="c9c67e8a-58e2-4733-9a1c-5d44fec4775b" providerId="ADAL" clId="{F9CDF985-13F2-499A-8A55-943F22618C3C}" dt="2023-09-26T21:27:55.972" v="6063"/>
-          <ac:spMkLst>
-            <pc:docMk/>
-            <pc:sldMk cId="661209559" sldId="256"/>
-            <ac:spMk id="7" creationId="{E84E79FB-42B5-4952-B840-D1974A38191C}"/>
-          </ac:spMkLst>
-        </pc:spChg>
-        <pc:spChg chg="add del mod">
-          <ac:chgData name="Marcia Moraes" userId="c9c67e8a-58e2-4733-9a1c-5d44fec4775b" providerId="ADAL" clId="{F9CDF985-13F2-499A-8A55-943F22618C3C}" dt="2023-09-26T21:27:59.274" v="6064"/>
-          <ac:spMkLst>
-            <pc:docMk/>
-            <pc:sldMk cId="661209559" sldId="256"/>
-            <ac:spMk id="8" creationId="{475D4A79-A43D-4436-AEE9-F16B21570364}"/>
-          </ac:spMkLst>
-        </pc:spChg>
-        <pc:spChg chg="add del mod">
-          <ac:chgData name="Marcia Moraes" userId="c9c67e8a-58e2-4733-9a1c-5d44fec4775b" providerId="ADAL" clId="{F9CDF985-13F2-499A-8A55-943F22618C3C}" dt="2023-09-26T21:27:59.274" v="6064"/>
-          <ac:spMkLst>
-            <pc:docMk/>
-            <pc:sldMk cId="661209559" sldId="256"/>
-            <ac:spMk id="9" creationId="{B3802B87-2A33-4312-A5DB-AE9A768E3A8F}"/>
-          </ac:spMkLst>
-        </pc:spChg>
-        <pc:spChg chg="add del mod">
-          <ac:chgData name="Marcia Moraes" userId="c9c67e8a-58e2-4733-9a1c-5d44fec4775b" providerId="ADAL" clId="{F9CDF985-13F2-499A-8A55-943F22618C3C}" dt="2023-09-26T21:28:11.076" v="6065"/>
-          <ac:spMkLst>
-            <pc:docMk/>
-            <pc:sldMk cId="661209559" sldId="256"/>
-            <ac:spMk id="10" creationId="{A2CE2476-E590-40CD-9783-0E923EBB4B25}"/>
-          </ac:spMkLst>
-        </pc:spChg>
-        <pc:spChg chg="add del mod">
-          <ac:chgData name="Marcia Moraes" userId="c9c67e8a-58e2-4733-9a1c-5d44fec4775b" providerId="ADAL" clId="{F9CDF985-13F2-499A-8A55-943F22618C3C}" dt="2023-09-26T21:28:11.076" v="6065"/>
-          <ac:spMkLst>
-            <pc:docMk/>
-            <pc:sldMk cId="661209559" sldId="256"/>
-            <ac:spMk id="11" creationId="{C54CC41A-6836-4E13-9C19-96DEDA0E99CC}"/>
-          </ac:spMkLst>
-        </pc:spChg>
-        <pc:spChg chg="add del mod">
-          <ac:chgData name="Marcia Moraes" userId="c9c67e8a-58e2-4733-9a1c-5d44fec4775b" providerId="ADAL" clId="{F9CDF985-13F2-499A-8A55-943F22618C3C}" dt="2023-09-26T21:28:12.266" v="6066"/>
-          <ac:spMkLst>
-            <pc:docMk/>
-            <pc:sldMk cId="661209559" sldId="256"/>
-            <ac:spMk id="12" creationId="{C4B29631-63AB-4E44-9AE0-738CC1CA28B2}"/>
-          </ac:spMkLst>
-        </pc:spChg>
-        <pc:spChg chg="add del mod">
-          <ac:chgData name="Marcia Moraes" userId="c9c67e8a-58e2-4733-9a1c-5d44fec4775b" providerId="ADAL" clId="{F9CDF985-13F2-499A-8A55-943F22618C3C}" dt="2023-09-26T21:28:12.266" v="6066"/>
-          <ac:spMkLst>
-            <pc:docMk/>
-            <pc:sldMk cId="661209559" sldId="256"/>
-            <ac:spMk id="13" creationId="{A8B0C91A-298E-48AC-B1AE-617A3AF7817D}"/>
-          </ac:spMkLst>
-        </pc:spChg>
-        <pc:spChg chg="add del mod">
-          <ac:chgData name="Marcia Moraes" userId="c9c67e8a-58e2-4733-9a1c-5d44fec4775b" providerId="ADAL" clId="{F9CDF985-13F2-499A-8A55-943F22618C3C}" dt="2023-09-26T21:28:12.658" v="6067"/>
-          <ac:spMkLst>
-            <pc:docMk/>
-            <pc:sldMk cId="661209559" sldId="256"/>
-            <ac:spMk id="14" creationId="{DCB71199-AAD5-4A4F-B7CD-9AFDE1755263}"/>
-          </ac:spMkLst>
-        </pc:spChg>
-        <pc:spChg chg="add del mod">
-          <ac:chgData name="Marcia Moraes" userId="c9c67e8a-58e2-4733-9a1c-5d44fec4775b" providerId="ADAL" clId="{F9CDF985-13F2-499A-8A55-943F22618C3C}" dt="2023-09-26T21:28:12.658" v="6067"/>
-          <ac:spMkLst>
-            <pc:docMk/>
-            <pc:sldMk cId="661209559" sldId="256"/>
-            <ac:spMk id="15" creationId="{6886BA6A-E2B1-4105-AC25-C2A60B307F6B}"/>
-          </ac:spMkLst>
-        </pc:spChg>
-        <pc:spChg chg="add del mod">
-          <ac:chgData name="Marcia Moraes" userId="c9c67e8a-58e2-4733-9a1c-5d44fec4775b" providerId="ADAL" clId="{F9CDF985-13F2-499A-8A55-943F22618C3C}" dt="2023-09-26T21:28:12.881" v="6068"/>
-          <ac:spMkLst>
-            <pc:docMk/>
-            <pc:sldMk cId="661209559" sldId="256"/>
-            <ac:spMk id="16" creationId="{212B24BC-7CFA-494A-AA47-3CBBF7C78B24}"/>
-          </ac:spMkLst>
-        </pc:spChg>
-        <pc:spChg chg="add del mod">
-          <ac:chgData name="Marcia Moraes" userId="c9c67e8a-58e2-4733-9a1c-5d44fec4775b" providerId="ADAL" clId="{F9CDF985-13F2-499A-8A55-943F22618C3C}" dt="2023-09-26T21:28:12.881" v="6068"/>
-          <ac:spMkLst>
-            <pc:docMk/>
-            <pc:sldMk cId="661209559" sldId="256"/>
-            <ac:spMk id="17" creationId="{25A6EAAA-056D-4832-9BDE-CD317893B1CF}"/>
-          </ac:spMkLst>
-        </pc:spChg>
-        <pc:spChg chg="add del mod">
-          <ac:chgData name="Marcia Moraes" userId="c9c67e8a-58e2-4733-9a1c-5d44fec4775b" providerId="ADAL" clId="{F9CDF985-13F2-499A-8A55-943F22618C3C}" dt="2023-09-26T21:37:59.178" v="6101"/>
-          <ac:spMkLst>
-            <pc:docMk/>
-            <pc:sldMk cId="661209559" sldId="256"/>
-            <ac:spMk id="18" creationId="{9F6F24CD-4DB9-45A4-884B-A412F5B130FF}"/>
-          </ac:spMkLst>
-        </pc:spChg>
-        <pc:spChg chg="add del mod">
-          <ac:chgData name="Marcia Moraes" userId="c9c67e8a-58e2-4733-9a1c-5d44fec4775b" providerId="ADAL" clId="{F9CDF985-13F2-499A-8A55-943F22618C3C}" dt="2023-09-26T21:37:53.600" v="6100"/>
-          <ac:spMkLst>
-            <pc:docMk/>
-            <pc:sldMk cId="661209559" sldId="256"/>
-            <ac:spMk id="19" creationId="{F19EC8BD-2311-48CA-B860-FCD6DBDB03F0}"/>
-          </ac:spMkLst>
-        </pc:spChg>
-        <pc:spChg chg="add del mod">
-          <ac:chgData name="Marcia Moraes" userId="c9c67e8a-58e2-4733-9a1c-5d44fec4775b" providerId="ADAL" clId="{F9CDF985-13F2-499A-8A55-943F22618C3C}" dt="2023-09-26T21:37:53.156" v="6099"/>
-          <ac:spMkLst>
-            <pc:docMk/>
-            <pc:sldMk cId="661209559" sldId="256"/>
-            <ac:spMk id="20" creationId="{719B80EC-D0EC-49B0-A413-AB0C0DC5DD56}"/>
-          </ac:spMkLst>
-        </pc:spChg>
-        <pc:spChg chg="add del mod">
-          <ac:chgData name="Marcia Moraes" userId="c9c67e8a-58e2-4733-9a1c-5d44fec4775b" providerId="ADAL" clId="{F9CDF985-13F2-499A-8A55-943F22618C3C}" dt="2023-09-26T21:37:53.156" v="6099"/>
-          <ac:spMkLst>
-            <pc:docMk/>
-            <pc:sldMk cId="661209559" sldId="256"/>
-            <ac:spMk id="21" creationId="{447B6AEA-E2A2-4124-B187-1F73903B5388}"/>
-          </ac:spMkLst>
-        </pc:spChg>
-        <pc:spChg chg="add del mod">
-          <ac:chgData name="Marcia Moraes" userId="c9c67e8a-58e2-4733-9a1c-5d44fec4775b" providerId="ADAL" clId="{F9CDF985-13F2-499A-8A55-943F22618C3C}" dt="2023-09-26T21:37:52.783" v="6098"/>
-          <ac:spMkLst>
-            <pc:docMk/>
-            <pc:sldMk cId="661209559" sldId="256"/>
-            <ac:spMk id="22" creationId="{0514D0EC-3B7D-4DFA-96A3-04B1E3E5E36C}"/>
-          </ac:spMkLst>
-        </pc:spChg>
-        <pc:spChg chg="add del mod">
-          <ac:chgData name="Marcia Moraes" userId="c9c67e8a-58e2-4733-9a1c-5d44fec4775b" providerId="ADAL" clId="{F9CDF985-13F2-499A-8A55-943F22618C3C}" dt="2023-09-26T21:37:52.783" v="6098"/>
-          <ac:spMkLst>
-            <pc:docMk/>
-            <pc:sldMk cId="661209559" sldId="256"/>
-            <ac:spMk id="23" creationId="{E6B594B3-9CC3-4F8B-9740-E46C7FCAD1E6}"/>
-          </ac:spMkLst>
-        </pc:spChg>
-        <pc:spChg chg="add del mod">
-          <ac:chgData name="Marcia Moraes" userId="c9c67e8a-58e2-4733-9a1c-5d44fec4775b" providerId="ADAL" clId="{F9CDF985-13F2-499A-8A55-943F22618C3C}" dt="2023-09-26T21:37:52.432" v="6097"/>
-          <ac:spMkLst>
-            <pc:docMk/>
-            <pc:sldMk cId="661209559" sldId="256"/>
-            <ac:spMk id="24" creationId="{DDDC149B-4258-432B-860D-14880CE6024C}"/>
-          </ac:spMkLst>
-        </pc:spChg>
-        <pc:spChg chg="add del mod">
-          <ac:chgData name="Marcia Moraes" userId="c9c67e8a-58e2-4733-9a1c-5d44fec4775b" providerId="ADAL" clId="{F9CDF985-13F2-499A-8A55-943F22618C3C}" dt="2023-09-26T21:37:52.432" v="6097"/>
-          <ac:spMkLst>
-            <pc:docMk/>
-            <pc:sldMk cId="661209559" sldId="256"/>
-            <ac:spMk id="25" creationId="{1F3C59C7-671C-4823-9D9C-3416028546C7}"/>
-          </ac:spMkLst>
-        </pc:spChg>
-        <pc:spChg chg="add del mod">
-          <ac:chgData name="Marcia Moraes" userId="c9c67e8a-58e2-4733-9a1c-5d44fec4775b" providerId="ADAL" clId="{F9CDF985-13F2-499A-8A55-943F22618C3C}" dt="2023-09-26T21:37:59.178" v="6101"/>
-          <ac:spMkLst>
-            <pc:docMk/>
-            <pc:sldMk cId="661209559" sldId="256"/>
-            <ac:spMk id="26" creationId="{787D8391-3B6B-430F-B9BF-3515D3634979}"/>
-          </ac:spMkLst>
-        </pc:spChg>
-        <pc:spChg chg="add del mod">
-          <ac:chgData name="Marcia Moraes" userId="c9c67e8a-58e2-4733-9a1c-5d44fec4775b" providerId="ADAL" clId="{F9CDF985-13F2-499A-8A55-943F22618C3C}" dt="2023-09-26T21:38:02.391" v="6102"/>
-          <ac:spMkLst>
-            <pc:docMk/>
-            <pc:sldMk cId="661209559" sldId="256"/>
-            <ac:spMk id="27" creationId="{B2F15635-5FDE-4464-981E-76807C3060C3}"/>
-          </ac:spMkLst>
-        </pc:spChg>
-        <pc:spChg chg="add del mod">
-          <ac:chgData name="Marcia Moraes" userId="c9c67e8a-58e2-4733-9a1c-5d44fec4775b" providerId="ADAL" clId="{F9CDF985-13F2-499A-8A55-943F22618C3C}" dt="2023-09-26T21:38:02.391" v="6102"/>
-          <ac:spMkLst>
-            <pc:docMk/>
-            <pc:sldMk cId="661209559" sldId="256"/>
-            <ac:spMk id="28" creationId="{D88D6534-30C3-40D7-B84E-C75F0E0915AA}"/>
-          </ac:spMkLst>
-        </pc:spChg>
-        <pc:spChg chg="add del mod">
-          <ac:chgData name="Marcia Moraes" userId="c9c67e8a-58e2-4733-9a1c-5d44fec4775b" providerId="ADAL" clId="{F9CDF985-13F2-499A-8A55-943F22618C3C}" dt="2023-09-26T21:38:12.702" v="6103"/>
-          <ac:spMkLst>
-            <pc:docMk/>
-            <pc:sldMk cId="661209559" sldId="256"/>
-            <ac:spMk id="29" creationId="{ED83E30B-875C-41AE-B1F4-C14A3FFCD5A8}"/>
-          </ac:spMkLst>
-        </pc:spChg>
-        <pc:spChg chg="add del mod">
-          <ac:chgData name="Marcia Moraes" userId="c9c67e8a-58e2-4733-9a1c-5d44fec4775b" providerId="ADAL" clId="{F9CDF985-13F2-499A-8A55-943F22618C3C}" dt="2023-09-26T21:38:12.702" v="6103"/>
-          <ac:spMkLst>
-            <pc:docMk/>
-            <pc:sldMk cId="661209559" sldId="256"/>
-            <ac:spMk id="30" creationId="{63A95D1E-4F42-4935-930B-2118DDE45AB1}"/>
-          </ac:spMkLst>
-        </pc:spChg>
-        <pc:spChg chg="add del mod">
-          <ac:chgData name="Marcia Moraes" userId="c9c67e8a-58e2-4733-9a1c-5d44fec4775b" providerId="ADAL" clId="{F9CDF985-13F2-499A-8A55-943F22618C3C}" dt="2023-09-26T21:38:28.414" v="6104" actId="478"/>
-          <ac:spMkLst>
-            <pc:docMk/>
-            <pc:sldMk cId="661209559" sldId="256"/>
-            <ac:spMk id="31" creationId="{B737E5DB-9D08-410F-AA5C-AC0E5AFF78D2}"/>
-          </ac:spMkLst>
-        </pc:spChg>
-        <pc:spChg chg="add del mod">
-          <ac:chgData name="Marcia Moraes" userId="c9c67e8a-58e2-4733-9a1c-5d44fec4775b" providerId="ADAL" clId="{F9CDF985-13F2-499A-8A55-943F22618C3C}" dt="2023-09-26T21:38:38.802" v="6105"/>
-          <ac:spMkLst>
-            <pc:docMk/>
-            <pc:sldMk cId="661209559" sldId="256"/>
-            <ac:spMk id="32" creationId="{267CA27E-4CB1-4DA7-BDF8-90DC1C0EEABC}"/>
-          </ac:spMkLst>
-        </pc:spChg>
-        <pc:spChg chg="add del mod">
-          <ac:chgData name="Marcia Moraes" userId="c9c67e8a-58e2-4733-9a1c-5d44fec4775b" providerId="ADAL" clId="{F9CDF985-13F2-499A-8A55-943F22618C3C}" dt="2023-09-26T22:06:42.612" v="6636"/>
-          <ac:spMkLst>
-            <pc:docMk/>
-            <pc:sldMk cId="661209559" sldId="256"/>
-            <ac:spMk id="33" creationId="{8D5FE942-F4B2-4C48-A7DA-3B6DE47DA7D2}"/>
-          </ac:spMkLst>
-        </pc:spChg>
-        <pc:spChg chg="add del mod">
-          <ac:chgData name="Marcia Moraes" userId="c9c67e8a-58e2-4733-9a1c-5d44fec4775b" providerId="ADAL" clId="{F9CDF985-13F2-499A-8A55-943F22618C3C}" dt="2023-09-26T22:06:42.612" v="6636"/>
-          <ac:spMkLst>
-            <pc:docMk/>
-            <pc:sldMk cId="661209559" sldId="256"/>
-            <ac:spMk id="34" creationId="{13D82973-5F3F-46B5-922F-7F976FDADCE8}"/>
-          </ac:spMkLst>
-        </pc:spChg>
-        <pc:spChg chg="add mod">
-          <ac:chgData name="Marcia Moraes" userId="c9c67e8a-58e2-4733-9a1c-5d44fec4775b" providerId="ADAL" clId="{F9CDF985-13F2-499A-8A55-943F22618C3C}" dt="2023-09-26T22:06:42.612" v="6636"/>
-          <ac:spMkLst>
-            <pc:docMk/>
-            <pc:sldMk cId="661209559" sldId="256"/>
-            <ac:spMk id="35" creationId="{3706C415-DAB1-455A-9847-133A35D685E8}"/>
-          </ac:spMkLst>
-        </pc:spChg>
-      </pc:sldChg>
-      <pc:sldChg chg="addSp delSp modSp">
-        <pc:chgData name="Marcia Moraes" userId="c9c67e8a-58e2-4733-9a1c-5d44fec4775b" providerId="ADAL" clId="{F9CDF985-13F2-499A-8A55-943F22618C3C}" dt="2023-09-26T21:54:56.986" v="6552" actId="962"/>
-        <pc:sldMkLst>
-          <pc:docMk/>
-          <pc:sldMk cId="407826274" sldId="258"/>
-        </pc:sldMkLst>
-        <pc:spChg chg="del mod topLvl">
-          <ac:chgData name="Marcia Moraes" userId="c9c67e8a-58e2-4733-9a1c-5d44fec4775b" providerId="ADAL" clId="{F9CDF985-13F2-499A-8A55-943F22618C3C}" dt="2023-09-26T21:40:36.542" v="6129" actId="478"/>
-          <ac:spMkLst>
-            <pc:docMk/>
-            <pc:sldMk cId="407826274" sldId="258"/>
-            <ac:spMk id="5" creationId="{DA95CF51-8E79-474D-B76D-003E76F96C2A}"/>
-          </ac:spMkLst>
-        </pc:spChg>
-        <pc:spChg chg="del mod topLvl">
-          <ac:chgData name="Marcia Moraes" userId="c9c67e8a-58e2-4733-9a1c-5d44fec4775b" providerId="ADAL" clId="{F9CDF985-13F2-499A-8A55-943F22618C3C}" dt="2023-09-26T21:40:35.364" v="6128" actId="478"/>
-          <ac:spMkLst>
-            <pc:docMk/>
-            <pc:sldMk cId="407826274" sldId="258"/>
-            <ac:spMk id="6" creationId="{DCF86168-D650-864E-B515-23840412627C}"/>
-          </ac:spMkLst>
-        </pc:spChg>
-        <pc:spChg chg="del mod topLvl">
-          <ac:chgData name="Marcia Moraes" userId="c9c67e8a-58e2-4733-9a1c-5d44fec4775b" providerId="ADAL" clId="{F9CDF985-13F2-499A-8A55-943F22618C3C}" dt="2023-09-26T21:40:34.085" v="6127" actId="478"/>
-          <ac:spMkLst>
-            <pc:docMk/>
-            <pc:sldMk cId="407826274" sldId="258"/>
-            <ac:spMk id="7" creationId="{47576919-F75C-3C41-8938-DDE50C14AF5B}"/>
-          </ac:spMkLst>
-        </pc:spChg>
-        <pc:spChg chg="mod topLvl">
-          <ac:chgData name="Marcia Moraes" userId="c9c67e8a-58e2-4733-9a1c-5d44fec4775b" providerId="ADAL" clId="{F9CDF985-13F2-499A-8A55-943F22618C3C}" dt="2023-09-26T21:40:45.884" v="6130" actId="164"/>
-          <ac:spMkLst>
-            <pc:docMk/>
-            <pc:sldMk cId="407826274" sldId="258"/>
-            <ac:spMk id="8" creationId="{449706A5-AE7F-F746-87B8-5975667FBAE0}"/>
-          </ac:spMkLst>
-        </pc:spChg>
-        <pc:spChg chg="mod topLvl">
-          <ac:chgData name="Marcia Moraes" userId="c9c67e8a-58e2-4733-9a1c-5d44fec4775b" providerId="ADAL" clId="{F9CDF985-13F2-499A-8A55-943F22618C3C}" dt="2023-09-26T21:40:45.884" v="6130" actId="164"/>
-          <ac:spMkLst>
-            <pc:docMk/>
-            <pc:sldMk cId="407826274" sldId="258"/>
-            <ac:spMk id="9" creationId="{B00240D5-B010-414A-9AE9-D19B175A7463}"/>
-          </ac:spMkLst>
-        </pc:spChg>
-        <pc:spChg chg="mod topLvl">
-          <ac:chgData name="Marcia Moraes" userId="c9c67e8a-58e2-4733-9a1c-5d44fec4775b" providerId="ADAL" clId="{F9CDF985-13F2-499A-8A55-943F22618C3C}" dt="2023-09-26T21:40:45.884" v="6130" actId="164"/>
-          <ac:spMkLst>
-            <pc:docMk/>
-            <pc:sldMk cId="407826274" sldId="258"/>
-            <ac:spMk id="10" creationId="{0CEF6381-413D-6940-910B-0C6D27599A1A}"/>
-          </ac:spMkLst>
-        </pc:spChg>
-        <pc:spChg chg="mod">
-          <ac:chgData name="Marcia Moraes" userId="c9c67e8a-58e2-4733-9a1c-5d44fec4775b" providerId="ADAL" clId="{F9CDF985-13F2-499A-8A55-943F22618C3C}" dt="2023-09-26T21:41:28.739" v="6133" actId="13244"/>
-          <ac:spMkLst>
-            <pc:docMk/>
-            <pc:sldMk cId="407826274" sldId="258"/>
-            <ac:spMk id="11" creationId="{38B5EEA3-6FD4-DA45-BE82-39C2D4E31FFF}"/>
-          </ac:spMkLst>
-        </pc:spChg>
-        <pc:spChg chg="mod">
-          <ac:chgData name="Marcia Moraes" userId="c9c67e8a-58e2-4733-9a1c-5d44fec4775b" providerId="ADAL" clId="{F9CDF985-13F2-499A-8A55-943F22618C3C}" dt="2023-09-26T21:41:07.143" v="6131" actId="13244"/>
-          <ac:spMkLst>
-            <pc:docMk/>
-            <pc:sldMk cId="407826274" sldId="258"/>
-            <ac:spMk id="13" creationId="{FF03C9D6-8EEF-754E-B157-10E7452FEDCA}"/>
-          </ac:spMkLst>
-        </pc:spChg>
-        <pc:spChg chg="mod">
-          <ac:chgData name="Marcia Moraes" userId="c9c67e8a-58e2-4733-9a1c-5d44fec4775b" providerId="ADAL" clId="{F9CDF985-13F2-499A-8A55-943F22618C3C}" dt="2023-09-26T21:41:14.733" v="6132" actId="13244"/>
-          <ac:spMkLst>
-            <pc:docMk/>
-            <pc:sldMk cId="407826274" sldId="258"/>
-            <ac:spMk id="14" creationId="{15CE75E1-C219-A443-AEB0-C98C30C96FAA}"/>
-          </ac:spMkLst>
-        </pc:spChg>
-        <pc:spChg chg="mod">
-          <ac:chgData name="Marcia Moraes" userId="c9c67e8a-58e2-4733-9a1c-5d44fec4775b" providerId="ADAL" clId="{F9CDF985-13F2-499A-8A55-943F22618C3C}" dt="2023-09-26T21:40:45.884" v="6130" actId="164"/>
-          <ac:spMkLst>
-            <pc:docMk/>
-            <pc:sldMk cId="407826274" sldId="258"/>
-            <ac:spMk id="15" creationId="{29E895D7-4A3D-2649-A596-95AFBC58D4C3}"/>
-          </ac:spMkLst>
-        </pc:spChg>
-        <pc:grpChg chg="del mod">
-          <ac:chgData name="Marcia Moraes" userId="c9c67e8a-58e2-4733-9a1c-5d44fec4775b" providerId="ADAL" clId="{F9CDF985-13F2-499A-8A55-943F22618C3C}" dt="2023-09-26T21:40:31.445" v="6126" actId="165"/>
-          <ac:grpSpMkLst>
-            <pc:docMk/>
-            <pc:sldMk cId="407826274" sldId="258"/>
-            <ac:grpSpMk id="4" creationId="{70D961CE-F386-9D4A-AC56-FA4FF9CAAD4F}"/>
-          </ac:grpSpMkLst>
-        </pc:grpChg>
-        <pc:grpChg chg="add mod">
-          <ac:chgData name="Marcia Moraes" userId="c9c67e8a-58e2-4733-9a1c-5d44fec4775b" providerId="ADAL" clId="{F9CDF985-13F2-499A-8A55-943F22618C3C}" dt="2023-09-26T21:54:56.986" v="6552" actId="962"/>
-          <ac:grpSpMkLst>
-            <pc:docMk/>
-            <pc:sldMk cId="407826274" sldId="258"/>
-            <ac:grpSpMk id="16" creationId="{7714DD22-A71D-463B-B18D-9045A7B15839}"/>
-          </ac:grpSpMkLst>
-        </pc:grpChg>
-        <pc:cxnChg chg="mod">
-          <ac:chgData name="Marcia Moraes" userId="c9c67e8a-58e2-4733-9a1c-5d44fec4775b" providerId="ADAL" clId="{F9CDF985-13F2-499A-8A55-943F22618C3C}" dt="2023-09-26T21:31:22.982" v="6075" actId="13244"/>
-          <ac:cxnSpMkLst>
-            <pc:docMk/>
-            <pc:sldMk cId="407826274" sldId="258"/>
-            <ac:cxnSpMk id="12" creationId="{E08B362F-300B-A648-8B73-8E490BC13D1C}"/>
-          </ac:cxnSpMkLst>
-        </pc:cxnChg>
-      </pc:sldChg>
-      <pc:sldChg chg="delSp modSp delAnim">
-        <pc:chgData name="Marcia Moraes" userId="c9c67e8a-58e2-4733-9a1c-5d44fec4775b" providerId="ADAL" clId="{F9CDF985-13F2-499A-8A55-943F22618C3C}" dt="2023-09-26T22:02:46.073" v="6582" actId="13244"/>
-        <pc:sldMkLst>
-          <pc:docMk/>
-          <pc:sldMk cId="1343308855" sldId="259"/>
-        </pc:sldMkLst>
-        <pc:spChg chg="mod">
-          <ac:chgData name="Marcia Moraes" userId="c9c67e8a-58e2-4733-9a1c-5d44fec4775b" providerId="ADAL" clId="{F9CDF985-13F2-499A-8A55-943F22618C3C}" dt="2023-09-26T21:48:39.822" v="6145" actId="14100"/>
-          <ac:spMkLst>
-            <pc:docMk/>
-            <pc:sldMk cId="1343308855" sldId="259"/>
-            <ac:spMk id="3" creationId="{BB2E3F74-0B0A-6547-9986-48509F1F6B1B}"/>
-          </ac:spMkLst>
-        </pc:spChg>
-        <pc:spChg chg="mod">
-          <ac:chgData name="Marcia Moraes" userId="c9c67e8a-58e2-4733-9a1c-5d44fec4775b" providerId="ADAL" clId="{F9CDF985-13F2-499A-8A55-943F22618C3C}" dt="2023-09-26T21:43:41.359" v="6137" actId="13244"/>
-          <ac:spMkLst>
-            <pc:docMk/>
-            <pc:sldMk cId="1343308855" sldId="259"/>
-            <ac:spMk id="6" creationId="{F42DEEB7-5CA3-41F8-9A0C-CC21CB114F7B}"/>
-          </ac:spMkLst>
-        </pc:spChg>
-        <pc:spChg chg="mod">
-          <ac:chgData name="Marcia Moraes" userId="c9c67e8a-58e2-4733-9a1c-5d44fec4775b" providerId="ADAL" clId="{F9CDF985-13F2-499A-8A55-943F22618C3C}" dt="2023-09-26T21:41:50.453" v="6135" actId="13244"/>
-          <ac:spMkLst>
-            <pc:docMk/>
-            <pc:sldMk cId="1343308855" sldId="259"/>
-            <ac:spMk id="12" creationId="{F99E289A-4830-1A4E-8CE2-ECE61E5B93B4}"/>
-          </ac:spMkLst>
-        </pc:spChg>
-        <pc:spChg chg="mod">
-          <ac:chgData name="Marcia Moraes" userId="c9c67e8a-58e2-4733-9a1c-5d44fec4775b" providerId="ADAL" clId="{F9CDF985-13F2-499A-8A55-943F22618C3C}" dt="2023-09-26T22:01:17.642" v="6577" actId="13244"/>
-          <ac:spMkLst>
-            <pc:docMk/>
-            <pc:sldMk cId="1343308855" sldId="259"/>
-            <ac:spMk id="20" creationId="{D8959A4F-8D87-485F-A00C-FD5BD49661FE}"/>
-          </ac:spMkLst>
-        </pc:spChg>
-        <pc:spChg chg="mod">
-          <ac:chgData name="Marcia Moraes" userId="c9c67e8a-58e2-4733-9a1c-5d44fec4775b" providerId="ADAL" clId="{F9CDF985-13F2-499A-8A55-943F22618C3C}" dt="2023-09-26T22:01:31.810" v="6578" actId="13244"/>
-          <ac:spMkLst>
-            <pc:docMk/>
-            <pc:sldMk cId="1343308855" sldId="259"/>
-            <ac:spMk id="21" creationId="{C77F46D6-3D91-4C0A-9BFD-35258A65A54D}"/>
-          </ac:spMkLst>
-        </pc:spChg>
-        <pc:spChg chg="mod">
-          <ac:chgData name="Marcia Moraes" userId="c9c67e8a-58e2-4733-9a1c-5d44fec4775b" providerId="ADAL" clId="{F9CDF985-13F2-499A-8A55-943F22618C3C}" dt="2023-09-26T22:01:53.096" v="6580" actId="13244"/>
-          <ac:spMkLst>
-            <pc:docMk/>
-            <pc:sldMk cId="1343308855" sldId="259"/>
-            <ac:spMk id="35" creationId="{FCFCC514-5C39-9545-9B58-05FFC97770E4}"/>
-          </ac:spMkLst>
-        </pc:spChg>
-        <pc:spChg chg="del mod">
-          <ac:chgData name="Marcia Moraes" userId="c9c67e8a-58e2-4733-9a1c-5d44fec4775b" providerId="ADAL" clId="{F9CDF985-13F2-499A-8A55-943F22618C3C}" dt="2023-09-26T21:55:25.328" v="6554" actId="478"/>
-          <ac:spMkLst>
-            <pc:docMk/>
-            <pc:sldMk cId="1343308855" sldId="259"/>
-            <ac:spMk id="36" creationId="{0E592941-EF31-9346-B3C5-E8CFAA6C2813}"/>
-          </ac:spMkLst>
-        </pc:spChg>
-        <pc:spChg chg="mod">
-          <ac:chgData name="Marcia Moraes" userId="c9c67e8a-58e2-4733-9a1c-5d44fec4775b" providerId="ADAL" clId="{F9CDF985-13F2-499A-8A55-943F22618C3C}" dt="2023-09-26T21:59:03.572" v="6567" actId="13244"/>
-          <ac:spMkLst>
-            <pc:docMk/>
-            <pc:sldMk cId="1343308855" sldId="259"/>
-            <ac:spMk id="37" creationId="{EFB599FA-BBD6-7540-B911-1F65D91E26E7}"/>
-          </ac:spMkLst>
-        </pc:spChg>
-        <pc:spChg chg="del mod">
-          <ac:chgData name="Marcia Moraes" userId="c9c67e8a-58e2-4733-9a1c-5d44fec4775b" providerId="ADAL" clId="{F9CDF985-13F2-499A-8A55-943F22618C3C}" dt="2023-09-26T21:55:35.805" v="6557" actId="478"/>
-          <ac:spMkLst>
-            <pc:docMk/>
-            <pc:sldMk cId="1343308855" sldId="259"/>
-            <ac:spMk id="38" creationId="{98DE8F27-BDB0-8C4F-BECA-40AEEC089344}"/>
-          </ac:spMkLst>
-        </pc:spChg>
-        <pc:spChg chg="mod">
-          <ac:chgData name="Marcia Moraes" userId="c9c67e8a-58e2-4733-9a1c-5d44fec4775b" providerId="ADAL" clId="{F9CDF985-13F2-499A-8A55-943F22618C3C}" dt="2023-09-26T21:59:05.127" v="6568" actId="13244"/>
-          <ac:spMkLst>
-            <pc:docMk/>
-            <pc:sldMk cId="1343308855" sldId="259"/>
-            <ac:spMk id="39" creationId="{BCD12800-188A-5240-B20C-5FFDBC8821E0}"/>
-          </ac:spMkLst>
-        </pc:spChg>
-        <pc:spChg chg="mod">
-          <ac:chgData name="Marcia Moraes" userId="c9c67e8a-58e2-4733-9a1c-5d44fec4775b" providerId="ADAL" clId="{F9CDF985-13F2-499A-8A55-943F22618C3C}" dt="2023-09-26T21:59:31.939" v="6571" actId="13244"/>
-          <ac:spMkLst>
-            <pc:docMk/>
-            <pc:sldMk cId="1343308855" sldId="259"/>
-            <ac:spMk id="40" creationId="{AC78575F-D371-B246-BAEF-A34BE9BAE4F2}"/>
-          </ac:spMkLst>
-        </pc:spChg>
-        <pc:spChg chg="mod">
-          <ac:chgData name="Marcia Moraes" userId="c9c67e8a-58e2-4733-9a1c-5d44fec4775b" providerId="ADAL" clId="{F9CDF985-13F2-499A-8A55-943F22618C3C}" dt="2023-09-26T22:00:58.709" v="6574" actId="14100"/>
-          <ac:spMkLst>
-            <pc:docMk/>
-            <pc:sldMk cId="1343308855" sldId="259"/>
-            <ac:spMk id="41" creationId="{97B1C44E-3A0B-1749-BB0A-F74A554C85B3}"/>
-          </ac:spMkLst>
-        </pc:spChg>
-        <pc:spChg chg="mod">
-          <ac:chgData name="Marcia Moraes" userId="c9c67e8a-58e2-4733-9a1c-5d44fec4775b" providerId="ADAL" clId="{F9CDF985-13F2-499A-8A55-943F22618C3C}" dt="2023-09-26T21:58:31.293" v="6565" actId="13244"/>
-          <ac:spMkLst>
-            <pc:docMk/>
-            <pc:sldMk cId="1343308855" sldId="259"/>
-            <ac:spMk id="42" creationId="{E5C89EAB-76A1-4FC2-81D3-8AE616B33CD7}"/>
-          </ac:spMkLst>
-        </pc:spChg>
-        <pc:spChg chg="mod">
-          <ac:chgData name="Marcia Moraes" userId="c9c67e8a-58e2-4733-9a1c-5d44fec4775b" providerId="ADAL" clId="{F9CDF985-13F2-499A-8A55-943F22618C3C}" dt="2023-09-26T22:00:24.348" v="6572" actId="13244"/>
-          <ac:spMkLst>
-            <pc:docMk/>
-            <pc:sldMk cId="1343308855" sldId="259"/>
-            <ac:spMk id="43" creationId="{9A2F6A80-599E-4203-BFBC-14604A4AD698}"/>
-          </ac:spMkLst>
-        </pc:spChg>
-        <pc:spChg chg="mod">
-          <ac:chgData name="Marcia Moraes" userId="c9c67e8a-58e2-4733-9a1c-5d44fec4775b" providerId="ADAL" clId="{F9CDF985-13F2-499A-8A55-943F22618C3C}" dt="2023-09-26T22:00:54.792" v="6573" actId="14100"/>
-          <ac:spMkLst>
-            <pc:docMk/>
-            <pc:sldMk cId="1343308855" sldId="259"/>
-            <ac:spMk id="44" creationId="{F12C7A14-A27B-46F1-A420-1A867B298A92}"/>
-          </ac:spMkLst>
-        </pc:spChg>
-        <pc:spChg chg="del mod">
-          <ac:chgData name="Marcia Moraes" userId="c9c67e8a-58e2-4733-9a1c-5d44fec4775b" providerId="ADAL" clId="{F9CDF985-13F2-499A-8A55-943F22618C3C}" dt="2023-09-26T21:55:37.982" v="6559" actId="478"/>
-          <ac:spMkLst>
-            <pc:docMk/>
-            <pc:sldMk cId="1343308855" sldId="259"/>
-            <ac:spMk id="46" creationId="{589B4477-ADB2-1A46-A70C-0AD90C8F5D06}"/>
-          </ac:spMkLst>
-        </pc:spChg>
-        <pc:spChg chg="mod">
-          <ac:chgData name="Marcia Moraes" userId="c9c67e8a-58e2-4733-9a1c-5d44fec4775b" providerId="ADAL" clId="{F9CDF985-13F2-499A-8A55-943F22618C3C}" dt="2023-09-26T21:57:37.756" v="6564" actId="1076"/>
-          <ac:spMkLst>
-            <pc:docMk/>
-            <pc:sldMk cId="1343308855" sldId="259"/>
-            <ac:spMk id="47" creationId="{120BE147-7AF7-C641-9E74-FEAA7017B467}"/>
-          </ac:spMkLst>
-        </pc:spChg>
-        <pc:spChg chg="mod">
-          <ac:chgData name="Marcia Moraes" userId="c9c67e8a-58e2-4733-9a1c-5d44fec4775b" providerId="ADAL" clId="{F9CDF985-13F2-499A-8A55-943F22618C3C}" dt="2023-09-26T21:57:06.864" v="6563" actId="1076"/>
-          <ac:spMkLst>
-            <pc:docMk/>
-            <pc:sldMk cId="1343308855" sldId="259"/>
-            <ac:spMk id="49" creationId="{C2AED161-79CB-2C4D-B1E4-4EAE033C09E6}"/>
-          </ac:spMkLst>
-        </pc:spChg>
-        <pc:spChg chg="mod">
-          <ac:chgData name="Marcia Moraes" userId="c9c67e8a-58e2-4733-9a1c-5d44fec4775b" providerId="ADAL" clId="{F9CDF985-13F2-499A-8A55-943F22618C3C}" dt="2023-09-26T21:49:17.492" v="6146" actId="13244"/>
-          <ac:spMkLst>
-            <pc:docMk/>
-            <pc:sldMk cId="1343308855" sldId="259"/>
-            <ac:spMk id="51" creationId="{07F618AB-0633-42A7-8E70-633C5FE07A16}"/>
-          </ac:spMkLst>
-        </pc:spChg>
-        <pc:spChg chg="mod">
-          <ac:chgData name="Marcia Moraes" userId="c9c67e8a-58e2-4733-9a1c-5d44fec4775b" providerId="ADAL" clId="{F9CDF985-13F2-499A-8A55-943F22618C3C}" dt="2023-09-26T22:01:36.744" v="6579" actId="13244"/>
-          <ac:spMkLst>
-            <pc:docMk/>
-            <pc:sldMk cId="1343308855" sldId="259"/>
-            <ac:spMk id="52" creationId="{3A9E3D22-2E04-4BC7-A800-B37D4D95A7C3}"/>
-          </ac:spMkLst>
-        </pc:spChg>
-        <pc:spChg chg="mod">
-          <ac:chgData name="Marcia Moraes" userId="c9c67e8a-58e2-4733-9a1c-5d44fec4775b" providerId="ADAL" clId="{F9CDF985-13F2-499A-8A55-943F22618C3C}" dt="2023-09-26T22:02:24.727" v="6581" actId="13244"/>
-          <ac:spMkLst>
-            <pc:docMk/>
-            <pc:sldMk cId="1343308855" sldId="259"/>
-            <ac:spMk id="53" creationId="{52CC0527-5F74-40D7-A571-E8439DB2D910}"/>
-          </ac:spMkLst>
-        </pc:spChg>
-        <pc:spChg chg="mod">
-          <ac:chgData name="Marcia Moraes" userId="c9c67e8a-58e2-4733-9a1c-5d44fec4775b" providerId="ADAL" clId="{F9CDF985-13F2-499A-8A55-943F22618C3C}" dt="2023-09-26T22:02:46.073" v="6582" actId="13244"/>
-          <ac:spMkLst>
-            <pc:docMk/>
-            <pc:sldMk cId="1343308855" sldId="259"/>
-            <ac:spMk id="54" creationId="{B2278DC8-1627-42DB-8479-D32302CC0993}"/>
-          </ac:spMkLst>
-        </pc:spChg>
-        <pc:grpChg chg="mod">
-          <ac:chgData name="Marcia Moraes" userId="c9c67e8a-58e2-4733-9a1c-5d44fec4775b" providerId="ADAL" clId="{F9CDF985-13F2-499A-8A55-943F22618C3C}" dt="2023-09-26T19:38:51.869" v="988" actId="962"/>
-          <ac:grpSpMkLst>
-            <pc:docMk/>
-            <pc:sldMk cId="1343308855" sldId="259"/>
-            <ac:grpSpMk id="22" creationId="{B58D6FCB-86EA-A341-86A4-8E046BC1B099}"/>
-          </ac:grpSpMkLst>
-        </pc:grpChg>
-        <pc:grpChg chg="mod">
-          <ac:chgData name="Marcia Moraes" userId="c9c67e8a-58e2-4733-9a1c-5d44fec4775b" providerId="ADAL" clId="{F9CDF985-13F2-499A-8A55-943F22618C3C}" dt="2023-09-26T19:39:15.740" v="1082" actId="962"/>
-          <ac:grpSpMkLst>
-            <pc:docMk/>
-            <pc:sldMk cId="1343308855" sldId="259"/>
-            <ac:grpSpMk id="34" creationId="{CB66FA66-C3C4-CC4E-90A9-872B55B056FD}"/>
-          </ac:grpSpMkLst>
-        </pc:grpChg>
-        <pc:picChg chg="mod">
-          <ac:chgData name="Marcia Moraes" userId="c9c67e8a-58e2-4733-9a1c-5d44fec4775b" providerId="ADAL" clId="{F9CDF985-13F2-499A-8A55-943F22618C3C}" dt="2023-09-26T21:41:48.926" v="6134" actId="13244"/>
-          <ac:picMkLst>
-            <pc:docMk/>
-            <pc:sldMk cId="1343308855" sldId="259"/>
-            <ac:picMk id="11" creationId="{F0DCE97F-719F-2542-AEE2-B60D165D2ECF}"/>
-          </ac:picMkLst>
-        </pc:picChg>
-      </pc:sldChg>
-      <pc:sldChg chg="delSp modSp delAnim">
-        <pc:chgData name="Marcia Moraes" userId="c9c67e8a-58e2-4733-9a1c-5d44fec4775b" providerId="ADAL" clId="{F9CDF985-13F2-499A-8A55-943F22618C3C}" dt="2023-09-26T20:16:46.767" v="4193" actId="962"/>
-        <pc:sldMkLst>
-          <pc:docMk/>
-          <pc:sldMk cId="2819649150" sldId="260"/>
-        </pc:sldMkLst>
-        <pc:spChg chg="mod">
-          <ac:chgData name="Marcia Moraes" userId="c9c67e8a-58e2-4733-9a1c-5d44fec4775b" providerId="ADAL" clId="{F9CDF985-13F2-499A-8A55-943F22618C3C}" dt="2023-09-26T20:10:45.145" v="2877" actId="962"/>
-          <ac:spMkLst>
-            <pc:docMk/>
-            <pc:sldMk cId="2819649150" sldId="260"/>
-            <ac:spMk id="3" creationId="{F61AA35C-A796-DC42-B4B2-5EAACF9AB9B7}"/>
-          </ac:spMkLst>
-        </pc:spChg>
-        <pc:spChg chg="del">
-          <ac:chgData name="Marcia Moraes" userId="c9c67e8a-58e2-4733-9a1c-5d44fec4775b" providerId="ADAL" clId="{F9CDF985-13F2-499A-8A55-943F22618C3C}" dt="2023-09-26T20:09:46.814" v="2806" actId="478"/>
-          <ac:spMkLst>
-            <pc:docMk/>
-            <pc:sldMk cId="2819649150" sldId="260"/>
-            <ac:spMk id="30" creationId="{79815508-53D6-1B4B-B36B-3413469E0348}"/>
-          </ac:spMkLst>
-        </pc:spChg>
-        <pc:spChg chg="mod">
-          <ac:chgData name="Marcia Moraes" userId="c9c67e8a-58e2-4733-9a1c-5d44fec4775b" providerId="ADAL" clId="{F9CDF985-13F2-499A-8A55-943F22618C3C}" dt="2023-09-26T20:12:21.477" v="3247" actId="962"/>
-          <ac:spMkLst>
-            <pc:docMk/>
-            <pc:sldMk cId="2819649150" sldId="260"/>
-            <ac:spMk id="31" creationId="{59F7DE06-E3E0-0946-938D-7B867E4842AD}"/>
-          </ac:spMkLst>
-        </pc:spChg>
-        <pc:spChg chg="del">
-          <ac:chgData name="Marcia Moraes" userId="c9c67e8a-58e2-4733-9a1c-5d44fec4775b" providerId="ADAL" clId="{F9CDF985-13F2-499A-8A55-943F22618C3C}" dt="2023-09-26T20:09:46.062" v="2805" actId="478"/>
-          <ac:spMkLst>
-            <pc:docMk/>
-            <pc:sldMk cId="2819649150" sldId="260"/>
-            <ac:spMk id="32" creationId="{ACB017FA-A7B0-BF49-829F-130D122A39CE}"/>
-          </ac:spMkLst>
-        </pc:spChg>
-        <pc:spChg chg="del">
-          <ac:chgData name="Marcia Moraes" userId="c9c67e8a-58e2-4733-9a1c-5d44fec4775b" providerId="ADAL" clId="{F9CDF985-13F2-499A-8A55-943F22618C3C}" dt="2023-09-26T20:09:45.265" v="2804" actId="478"/>
-          <ac:spMkLst>
-            <pc:docMk/>
-            <pc:sldMk cId="2819649150" sldId="260"/>
-            <ac:spMk id="34" creationId="{FBF41110-2626-084F-AEE8-CC833E6AC9C1}"/>
-          </ac:spMkLst>
-        </pc:spChg>
-        <pc:spChg chg="mod">
-          <ac:chgData name="Marcia Moraes" userId="c9c67e8a-58e2-4733-9a1c-5d44fec4775b" providerId="ADAL" clId="{F9CDF985-13F2-499A-8A55-943F22618C3C}" dt="2023-09-26T20:13:00.167" v="3585" actId="962"/>
-          <ac:spMkLst>
-            <pc:docMk/>
-            <pc:sldMk cId="2819649150" sldId="260"/>
-            <ac:spMk id="35" creationId="{7C4667D6-5B79-9A49-BF35-4FE7A8347533}"/>
-          </ac:spMkLst>
-        </pc:spChg>
-        <pc:spChg chg="mod">
-          <ac:chgData name="Marcia Moraes" userId="c9c67e8a-58e2-4733-9a1c-5d44fec4775b" providerId="ADAL" clId="{F9CDF985-13F2-499A-8A55-943F22618C3C}" dt="2023-09-26T20:13:29.491" v="3777" actId="962"/>
-          <ac:spMkLst>
-            <pc:docMk/>
-            <pc:sldMk cId="2819649150" sldId="260"/>
-            <ac:spMk id="36" creationId="{1CDEC4B8-22B0-1940-B3E3-F3F504BE0FE4}"/>
-          </ac:spMkLst>
-        </pc:spChg>
-        <pc:grpChg chg="mod">
-          <ac:chgData name="Marcia Moraes" userId="c9c67e8a-58e2-4733-9a1c-5d44fec4775b" providerId="ADAL" clId="{F9CDF985-13F2-499A-8A55-943F22618C3C}" dt="2023-09-26T20:16:46.767" v="4193" actId="962"/>
-          <ac:grpSpMkLst>
-            <pc:docMk/>
-            <pc:sldMk cId="2819649150" sldId="260"/>
-            <ac:grpSpMk id="4" creationId="{FECDDFAA-8DBE-B44D-A594-DE77B9561D15}"/>
-          </ac:grpSpMkLst>
-        </pc:grpChg>
-        <pc:grpChg chg="mod">
-          <ac:chgData name="Marcia Moraes" userId="c9c67e8a-58e2-4733-9a1c-5d44fec4775b" providerId="ADAL" clId="{F9CDF985-13F2-499A-8A55-943F22618C3C}" dt="2023-09-26T20:10:56.803" v="2953" actId="962"/>
-          <ac:grpSpMkLst>
-            <pc:docMk/>
-            <pc:sldMk cId="2819649150" sldId="260"/>
-            <ac:grpSpMk id="18" creationId="{3EBEC335-D386-9E4E-A1F5-623646901AD4}"/>
-          </ac:grpSpMkLst>
-        </pc:grpChg>
-      </pc:sldChg>
-      <pc:sldChg chg="delSp modSp delAnim">
-        <pc:chgData name="Marcia Moraes" userId="c9c67e8a-58e2-4733-9a1c-5d44fec4775b" providerId="ADAL" clId="{F9CDF985-13F2-499A-8A55-943F22618C3C}" dt="2023-09-26T20:20:03.308" v="5021" actId="962"/>
-        <pc:sldMkLst>
-          <pc:docMk/>
-          <pc:sldMk cId="3969704182" sldId="261"/>
-        </pc:sldMkLst>
-        <pc:spChg chg="del mod">
-          <ac:chgData name="Marcia Moraes" userId="c9c67e8a-58e2-4733-9a1c-5d44fec4775b" providerId="ADAL" clId="{F9CDF985-13F2-499A-8A55-943F22618C3C}" dt="2023-09-26T20:17:08.858" v="4199" actId="478"/>
-          <ac:spMkLst>
-            <pc:docMk/>
-            <pc:sldMk cId="3969704182" sldId="261"/>
-            <ac:spMk id="32" creationId="{017EB187-7857-AE4D-AFEB-F1C0876F0D79}"/>
-          </ac:spMkLst>
-        </pc:spChg>
-        <pc:spChg chg="mod">
-          <ac:chgData name="Marcia Moraes" userId="c9c67e8a-58e2-4733-9a1c-5d44fec4775b" providerId="ADAL" clId="{F9CDF985-13F2-499A-8A55-943F22618C3C}" dt="2023-09-26T20:18:55.538" v="4491" actId="962"/>
-          <ac:spMkLst>
-            <pc:docMk/>
-            <pc:sldMk cId="3969704182" sldId="261"/>
-            <ac:spMk id="33" creationId="{2B1E1E19-C5DB-404E-A331-DF858E9890DE}"/>
-          </ac:spMkLst>
-        </pc:spChg>
-        <pc:spChg chg="del">
-          <ac:chgData name="Marcia Moraes" userId="c9c67e8a-58e2-4733-9a1c-5d44fec4775b" providerId="ADAL" clId="{F9CDF985-13F2-499A-8A55-943F22618C3C}" dt="2023-09-26T20:17:09.679" v="4200" actId="478"/>
-          <ac:spMkLst>
-            <pc:docMk/>
-            <pc:sldMk cId="3969704182" sldId="261"/>
-            <ac:spMk id="34" creationId="{915607F0-B2B5-0341-A396-5181856A0C01}"/>
-          </ac:spMkLst>
-        </pc:spChg>
-        <pc:spChg chg="del">
-          <ac:chgData name="Marcia Moraes" userId="c9c67e8a-58e2-4733-9a1c-5d44fec4775b" providerId="ADAL" clId="{F9CDF985-13F2-499A-8A55-943F22618C3C}" dt="2023-09-26T20:17:10.241" v="4201" actId="478"/>
-          <ac:spMkLst>
-            <pc:docMk/>
-            <pc:sldMk cId="3969704182" sldId="261"/>
-            <ac:spMk id="35" creationId="{0A59FBAF-CAB1-5D4F-95AE-147AFF79856C}"/>
-          </ac:spMkLst>
-        </pc:spChg>
-        <pc:spChg chg="mod">
-          <ac:chgData name="Marcia Moraes" userId="c9c67e8a-58e2-4733-9a1c-5d44fec4775b" providerId="ADAL" clId="{F9CDF985-13F2-499A-8A55-943F22618C3C}" dt="2023-09-26T20:18:39.638" v="4351" actId="962"/>
-          <ac:spMkLst>
-            <pc:docMk/>
-            <pc:sldMk cId="3969704182" sldId="261"/>
-            <ac:spMk id="36" creationId="{C2B3C5A5-81D3-3548-BA94-2516A97444F6}"/>
-          </ac:spMkLst>
-        </pc:spChg>
-        <pc:spChg chg="mod">
-          <ac:chgData name="Marcia Moraes" userId="c9c67e8a-58e2-4733-9a1c-5d44fec4775b" providerId="ADAL" clId="{F9CDF985-13F2-499A-8A55-943F22618C3C}" dt="2023-09-26T20:20:03.308" v="5021" actId="962"/>
-          <ac:spMkLst>
-            <pc:docMk/>
-            <pc:sldMk cId="3969704182" sldId="261"/>
-            <ac:spMk id="37" creationId="{3B2E7133-09B8-174E-B092-81E9AF4728D9}"/>
-          </ac:spMkLst>
-        </pc:spChg>
-        <pc:spChg chg="del">
-          <ac:chgData name="Marcia Moraes" userId="c9c67e8a-58e2-4733-9a1c-5d44fec4775b" providerId="ADAL" clId="{F9CDF985-13F2-499A-8A55-943F22618C3C}" dt="2023-09-26T20:17:11.013" v="4202" actId="478"/>
-          <ac:spMkLst>
-            <pc:docMk/>
-            <pc:sldMk cId="3969704182" sldId="261"/>
-            <ac:spMk id="38" creationId="{A294F2B3-B1F1-9A49-A709-CC8290184E56}"/>
-          </ac:spMkLst>
-        </pc:spChg>
-        <pc:spChg chg="del">
-          <ac:chgData name="Marcia Moraes" userId="c9c67e8a-58e2-4733-9a1c-5d44fec4775b" providerId="ADAL" clId="{F9CDF985-13F2-499A-8A55-943F22618C3C}" dt="2023-09-26T20:17:11.599" v="4203" actId="478"/>
-          <ac:spMkLst>
-            <pc:docMk/>
-            <pc:sldMk cId="3969704182" sldId="261"/>
-            <ac:spMk id="39" creationId="{18FC5334-3259-4840-B57D-7758DF545E63}"/>
-          </ac:spMkLst>
-        </pc:spChg>
-        <pc:spChg chg="mod">
-          <ac:chgData name="Marcia Moraes" userId="c9c67e8a-58e2-4733-9a1c-5d44fec4775b" providerId="ADAL" clId="{F9CDF985-13F2-499A-8A55-943F22618C3C}" dt="2023-09-26T20:19:15.010" v="4631" actId="962"/>
-          <ac:spMkLst>
-            <pc:docMk/>
-            <pc:sldMk cId="3969704182" sldId="261"/>
-            <ac:spMk id="40" creationId="{03AD9CED-43F3-4949-A164-1CF83F18E665}"/>
-          </ac:spMkLst>
-        </pc:spChg>
-        <pc:spChg chg="mod">
-          <ac:chgData name="Marcia Moraes" userId="c9c67e8a-58e2-4733-9a1c-5d44fec4775b" providerId="ADAL" clId="{F9CDF985-13F2-499A-8A55-943F22618C3C}" dt="2023-09-26T20:19:32.107" v="4773" actId="962"/>
-          <ac:spMkLst>
-            <pc:docMk/>
-            <pc:sldMk cId="3969704182" sldId="261"/>
-            <ac:spMk id="41" creationId="{1686E56B-E4DC-5A49-B17E-21E216796BDA}"/>
-          </ac:spMkLst>
-        </pc:spChg>
-        <pc:grpChg chg="mod">
-          <ac:chgData name="Marcia Moraes" userId="c9c67e8a-58e2-4733-9a1c-5d44fec4775b" providerId="ADAL" clId="{F9CDF985-13F2-499A-8A55-943F22618C3C}" dt="2023-09-26T20:16:03.083" v="3877" actId="962"/>
-          <ac:grpSpMkLst>
-            <pc:docMk/>
-            <pc:sldMk cId="3969704182" sldId="261"/>
-            <ac:grpSpMk id="4" creationId="{6FBCF6E0-5116-BF4A-B988-5D60F827EB22}"/>
-          </ac:grpSpMkLst>
-        </pc:grpChg>
-        <pc:grpChg chg="mod">
-          <ac:chgData name="Marcia Moraes" userId="c9c67e8a-58e2-4733-9a1c-5d44fec4775b" providerId="ADAL" clId="{F9CDF985-13F2-499A-8A55-943F22618C3C}" dt="2023-09-26T20:16:25.435" v="4059" actId="962"/>
-          <ac:grpSpMkLst>
-            <pc:docMk/>
-            <pc:sldMk cId="3969704182" sldId="261"/>
-            <ac:grpSpMk id="18" creationId="{FC70B80D-4086-374C-BC3F-D51EE350DD2A}"/>
-          </ac:grpSpMkLst>
-        </pc:grpChg>
-      </pc:sldChg>
       <pc:sldChg chg="modSp">
-        <pc:chgData name="Marcia Moraes" userId="c9c67e8a-58e2-4733-9a1c-5d44fec4775b" providerId="ADAL" clId="{F9CDF985-13F2-499A-8A55-943F22618C3C}" dt="2023-09-26T22:04:57.491" v="6583" actId="13244"/>
-        <pc:sldMkLst>
-          <pc:docMk/>
-          <pc:sldMk cId="481316595" sldId="262"/>
-        </pc:sldMkLst>
-        <pc:spChg chg="mod">
-          <ac:chgData name="Marcia Moraes" userId="c9c67e8a-58e2-4733-9a1c-5d44fec4775b" providerId="ADAL" clId="{F9CDF985-13F2-499A-8A55-943F22618C3C}" dt="2023-09-26T21:29:47.482" v="6072" actId="207"/>
-          <ac:spMkLst>
-            <pc:docMk/>
-            <pc:sldMk cId="481316595" sldId="262"/>
-            <ac:spMk id="4" creationId="{95DC637E-12B4-584C-8EDE-84FFD545EE73}"/>
-          </ac:spMkLst>
-        </pc:spChg>
-        <pc:spChg chg="mod">
-          <ac:chgData name="Marcia Moraes" userId="c9c67e8a-58e2-4733-9a1c-5d44fec4775b" providerId="ADAL" clId="{F9CDF985-13F2-499A-8A55-943F22618C3C}" dt="2023-09-26T22:04:57.491" v="6583" actId="13244"/>
-          <ac:spMkLst>
-            <pc:docMk/>
-            <pc:sldMk cId="481316595" sldId="262"/>
-            <ac:spMk id="5" creationId="{569F2272-3E70-1042-97AE-028C2CE64242}"/>
-          </ac:spMkLst>
-        </pc:spChg>
-      </pc:sldChg>
-      <pc:sldChg chg="modSp">
-        <pc:chgData name="Marcia Moraes" userId="c9c67e8a-58e2-4733-9a1c-5d44fec4775b" providerId="ADAL" clId="{F9CDF985-13F2-499A-8A55-943F22618C3C}" dt="2023-09-26T21:19:43.864" v="5517" actId="962"/>
-        <pc:sldMkLst>
-          <pc:docMk/>
-          <pc:sldMk cId="922784966" sldId="263"/>
-        </pc:sldMkLst>
-        <pc:grpChg chg="mod">
-          <ac:chgData name="Marcia Moraes" userId="c9c67e8a-58e2-4733-9a1c-5d44fec4775b" providerId="ADAL" clId="{F9CDF985-13F2-499A-8A55-943F22618C3C}" dt="2023-09-26T20:20:26.790" v="5133" actId="962"/>
-          <ac:grpSpMkLst>
-            <pc:docMk/>
-            <pc:sldMk cId="922784966" sldId="263"/>
-            <ac:grpSpMk id="4" creationId="{D985D3A1-7E2B-5E4C-9051-BAC0BCA72826}"/>
-          </ac:grpSpMkLst>
-        </pc:grpChg>
-        <pc:grpChg chg="mod">
-          <ac:chgData name="Marcia Moraes" userId="c9c67e8a-58e2-4733-9a1c-5d44fec4775b" providerId="ADAL" clId="{F9CDF985-13F2-499A-8A55-943F22618C3C}" dt="2023-09-26T21:19:43.864" v="5517" actId="962"/>
-          <ac:grpSpMkLst>
-            <pc:docMk/>
-            <pc:sldMk cId="922784966" sldId="263"/>
-            <ac:grpSpMk id="18" creationId="{973FBECF-0B96-9C49-93B0-CDFB2AE84414}"/>
-          </ac:grpSpMkLst>
-        </pc:grpChg>
-      </pc:sldChg>
-      <pc:sldChg chg="modSp">
-        <pc:chgData name="Marcia Moraes" userId="c9c67e8a-58e2-4733-9a1c-5d44fec4775b" providerId="ADAL" clId="{F9CDF985-13F2-499A-8A55-943F22618C3C}" dt="2023-09-26T21:28:39.803" v="6070" actId="208"/>
-        <pc:sldMkLst>
-          <pc:docMk/>
-          <pc:sldMk cId="517950337" sldId="264"/>
-        </pc:sldMkLst>
-        <pc:spChg chg="mod">
-          <ac:chgData name="Marcia Moraes" userId="c9c67e8a-58e2-4733-9a1c-5d44fec4775b" providerId="ADAL" clId="{F9CDF985-13F2-499A-8A55-943F22618C3C}" dt="2023-09-26T21:28:39.803" v="6070" actId="208"/>
-          <ac:spMkLst>
-            <pc:docMk/>
-            <pc:sldMk cId="517950337" sldId="264"/>
-            <ac:spMk id="5" creationId="{A94513F3-5A4B-4FA4-A070-ED9CE1FAC993}"/>
-          </ac:spMkLst>
-        </pc:spChg>
-      </pc:sldChg>
-      <pc:sldChg chg="addSp delSp modSp">
-        <pc:chgData name="Marcia Moraes" userId="c9c67e8a-58e2-4733-9a1c-5d44fec4775b" providerId="ADAL" clId="{F9CDF985-13F2-499A-8A55-943F22618C3C}" dt="2023-09-26T21:34:09.751" v="6090" actId="478"/>
+        <pc:chgData name="Marcia Moraes" userId="c9c67e8a-58e2-4733-9a1c-5d44fec4775b" providerId="ADAL" clId="{9A38EEB2-3541-4D9F-8B2C-BF5F0D2F131E}" dt="2024-02-16T17:37:48.917" v="2" actId="20577"/>
         <pc:sldMkLst>
           <pc:docMk/>
           <pc:sldMk cId="2019265180" sldId="270"/>
         </pc:sldMkLst>
-        <pc:spChg chg="mod">
-          <ac:chgData name="Marcia Moraes" userId="c9c67e8a-58e2-4733-9a1c-5d44fec4775b" providerId="ADAL" clId="{F9CDF985-13F2-499A-8A55-943F22618C3C}" dt="2023-09-26T21:33:59.212" v="6089"/>
-          <ac:spMkLst>
-            <pc:docMk/>
-            <pc:sldMk cId="2019265180" sldId="270"/>
-            <ac:spMk id="2" creationId="{05CD00A8-A4FA-4E9B-9199-C0E207B0496C}"/>
-          </ac:spMkLst>
-        </pc:spChg>
-        <pc:spChg chg="add mod">
-          <ac:chgData name="Marcia Moraes" userId="c9c67e8a-58e2-4733-9a1c-5d44fec4775b" providerId="ADAL" clId="{F9CDF985-13F2-499A-8A55-943F22618C3C}" dt="2023-09-14T13:59:35.254" v="173" actId="20577"/>
-          <ac:spMkLst>
-            <pc:docMk/>
-            <pc:sldMk cId="2019265180" sldId="270"/>
-            <ac:spMk id="5" creationId="{24E59D90-8018-493E-AFF9-3C08F4AFF82A}"/>
-          </ac:spMkLst>
-        </pc:spChg>
-        <pc:spChg chg="mod">
-          <ac:chgData name="Marcia Moraes" userId="c9c67e8a-58e2-4733-9a1c-5d44fec4775b" providerId="ADAL" clId="{F9CDF985-13F2-499A-8A55-943F22618C3C}" dt="2023-09-26T21:32:23.340" v="6079" actId="13244"/>
-          <ac:spMkLst>
-            <pc:docMk/>
-            <pc:sldMk cId="2019265180" sldId="270"/>
-            <ac:spMk id="7" creationId="{900B76C7-4821-426C-9C80-6ADC6DD0EA77}"/>
-          </ac:spMkLst>
-        </pc:spChg>
-        <pc:spChg chg="add del mod">
-          <ac:chgData name="Marcia Moraes" userId="c9c67e8a-58e2-4733-9a1c-5d44fec4775b" providerId="ADAL" clId="{F9CDF985-13F2-499A-8A55-943F22618C3C}" dt="2023-09-26T21:34:09.751" v="6090" actId="478"/>
-          <ac:spMkLst>
-            <pc:docMk/>
-            <pc:sldMk cId="2019265180" sldId="270"/>
-            <ac:spMk id="9" creationId="{18E88ED5-EC37-448E-ABD2-96F91BD2EBCD}"/>
-          </ac:spMkLst>
-        </pc:spChg>
-        <pc:spChg chg="add del">
-          <ac:chgData name="Marcia Moraes" userId="c9c67e8a-58e2-4733-9a1c-5d44fec4775b" providerId="ADAL" clId="{F9CDF985-13F2-499A-8A55-943F22618C3C}" dt="2023-09-26T21:33:43.186" v="6085"/>
-          <ac:spMkLst>
-            <pc:docMk/>
-            <pc:sldMk cId="2019265180" sldId="270"/>
-            <ac:spMk id="10" creationId="{DF151C03-C433-4A3B-87C4-6F70087D8A29}"/>
-          </ac:spMkLst>
-        </pc:spChg>
-        <pc:graphicFrameChg chg="add del mod modGraphic">
-          <ac:chgData name="Marcia Moraes" userId="c9c67e8a-58e2-4733-9a1c-5d44fec4775b" providerId="ADAL" clId="{F9CDF985-13F2-499A-8A55-943F22618C3C}" dt="2023-09-26T18:59:45.495" v="174"/>
-          <ac:graphicFrameMkLst>
-            <pc:docMk/>
-            <pc:sldMk cId="2019265180" sldId="270"/>
-            <ac:graphicFrameMk id="3" creationId="{4A37E52F-0E20-4E7D-996C-8020D7FF679E}"/>
-          </ac:graphicFrameMkLst>
-        </pc:graphicFrameChg>
-        <pc:graphicFrameChg chg="add del mod modGraphic">
-          <ac:chgData name="Marcia Moraes" userId="c9c67e8a-58e2-4733-9a1c-5d44fec4775b" providerId="ADAL" clId="{F9CDF985-13F2-499A-8A55-943F22618C3C}" dt="2023-09-26T19:00:30.560" v="178"/>
-          <ac:graphicFrameMkLst>
-            <pc:docMk/>
-            <pc:sldMk cId="2019265180" sldId="270"/>
-            <ac:graphicFrameMk id="6" creationId="{4BBFA115-8703-4DD8-9D77-8948D6293AFA}"/>
-          </ac:graphicFrameMkLst>
-        </pc:graphicFrameChg>
-        <pc:graphicFrameChg chg="add mod modGraphic">
-          <ac:chgData name="Marcia Moraes" userId="c9c67e8a-58e2-4733-9a1c-5d44fec4775b" providerId="ADAL" clId="{F9CDF985-13F2-499A-8A55-943F22618C3C}" dt="2023-09-26T21:23:53.700" v="6010" actId="207"/>
+        <pc:graphicFrameChg chg="modGraphic">
+          <ac:chgData name="Marcia Moraes" userId="c9c67e8a-58e2-4733-9a1c-5d44fec4775b" providerId="ADAL" clId="{9A38EEB2-3541-4D9F-8B2C-BF5F0D2F131E}" dt="2024-02-16T17:37:48.917" v="2" actId="20577"/>
           <ac:graphicFrameMkLst>
             <pc:docMk/>
             <pc:sldMk cId="2019265180" sldId="270"/>
             <ac:graphicFrameMk id="8" creationId="{4C38515A-151F-4171-8827-C40ADC6578F4}"/>
           </ac:graphicFrameMkLst>
         </pc:graphicFrameChg>
-        <pc:picChg chg="mod">
-          <ac:chgData name="Marcia Moraes" userId="c9c67e8a-58e2-4733-9a1c-5d44fec4775b" providerId="ADAL" clId="{F9CDF985-13F2-499A-8A55-943F22618C3C}" dt="2023-09-26T21:33:48.634" v="6088"/>
-          <ac:picMkLst>
-            <pc:docMk/>
-            <pc:sldMk cId="2019265180" sldId="270"/>
-            <ac:picMk id="1026" creationId="{FA180B9E-6C50-4161-9B7C-073A82DBEF38}"/>
-          </ac:picMkLst>
-        </pc:picChg>
-      </pc:sldChg>
-      <pc:sldChg chg="modSp">
-        <pc:chgData name="Marcia Moraes" userId="c9c67e8a-58e2-4733-9a1c-5d44fec4775b" providerId="ADAL" clId="{F9CDF985-13F2-499A-8A55-943F22618C3C}" dt="2023-09-14T13:56:56.723" v="13"/>
-        <pc:sldMkLst>
-          <pc:docMk/>
-          <pc:sldMk cId="2302936247" sldId="272"/>
-        </pc:sldMkLst>
-        <pc:spChg chg="mod">
-          <ac:chgData name="Marcia Moraes" userId="c9c67e8a-58e2-4733-9a1c-5d44fec4775b" providerId="ADAL" clId="{F9CDF985-13F2-499A-8A55-943F22618C3C}" dt="2023-09-14T13:56:56.723" v="13"/>
-          <ac:spMkLst>
-            <pc:docMk/>
-            <pc:sldMk cId="2302936247" sldId="272"/>
-            <ac:spMk id="5" creationId="{60370ACD-6E3D-5D4E-8918-7EDF38D2E5B4}"/>
-          </ac:spMkLst>
-        </pc:spChg>
-      </pc:sldChg>
-      <pc:sldChg chg="del">
-        <pc:chgData name="Marcia Moraes" userId="c9c67e8a-58e2-4733-9a1c-5d44fec4775b" providerId="ADAL" clId="{F9CDF985-13F2-499A-8A55-943F22618C3C}" dt="2023-09-26T19:56:10.952" v="2442" actId="2696"/>
-        <pc:sldMkLst>
-          <pc:docMk/>
-          <pc:sldMk cId="4235027745" sldId="273"/>
-        </pc:sldMkLst>
-      </pc:sldChg>
-      <pc:sldChg chg="modSp">
-        <pc:chgData name="Marcia Moraes" userId="c9c67e8a-58e2-4733-9a1c-5d44fec4775b" providerId="ADAL" clId="{F9CDF985-13F2-499A-8A55-943F22618C3C}" dt="2023-09-26T21:19:00.296" v="5355" actId="962"/>
-        <pc:sldMkLst>
-          <pc:docMk/>
-          <pc:sldMk cId="564003476" sldId="274"/>
-        </pc:sldMkLst>
-        <pc:picChg chg="mod">
-          <ac:chgData name="Marcia Moraes" userId="c9c67e8a-58e2-4733-9a1c-5d44fec4775b" providerId="ADAL" clId="{F9CDF985-13F2-499A-8A55-943F22618C3C}" dt="2023-09-26T21:19:00.296" v="5355" actId="962"/>
-          <ac:picMkLst>
-            <pc:docMk/>
-            <pc:sldMk cId="564003476" sldId="274"/>
-            <ac:picMk id="4" creationId="{945CAD51-4638-4142-B0EF-8F0CA1129911}"/>
-          </ac:picMkLst>
-        </pc:picChg>
-      </pc:sldChg>
-      <pc:sldChg chg="modSp">
-        <pc:chgData name="Marcia Moraes" userId="c9c67e8a-58e2-4733-9a1c-5d44fec4775b" providerId="ADAL" clId="{F9CDF985-13F2-499A-8A55-943F22618C3C}" dt="2023-09-26T21:39:28.421" v="6125" actId="20577"/>
-        <pc:sldMkLst>
-          <pc:docMk/>
-          <pc:sldMk cId="2926028301" sldId="275"/>
-        </pc:sldMkLst>
-        <pc:spChg chg="mod">
-          <ac:chgData name="Marcia Moraes" userId="c9c67e8a-58e2-4733-9a1c-5d44fec4775b" providerId="ADAL" clId="{F9CDF985-13F2-499A-8A55-943F22618C3C}" dt="2023-09-26T21:39:28.421" v="6125" actId="20577"/>
-          <ac:spMkLst>
-            <pc:docMk/>
-            <pc:sldMk cId="2926028301" sldId="275"/>
-            <ac:spMk id="2" creationId="{1060DE03-5D81-4A93-A5A7-5046D4901476}"/>
-          </ac:spMkLst>
-        </pc:spChg>
-        <pc:spChg chg="mod">
-          <ac:chgData name="Marcia Moraes" userId="c9c67e8a-58e2-4733-9a1c-5d44fec4775b" providerId="ADAL" clId="{F9CDF985-13F2-499A-8A55-943F22618C3C}" dt="2023-09-26T21:21:28.785" v="6003" actId="962"/>
-          <ac:spMkLst>
-            <pc:docMk/>
-            <pc:sldMk cId="2926028301" sldId="275"/>
-            <ac:spMk id="8" creationId="{D1345234-EB99-4577-A3EB-4693730B119D}"/>
-          </ac:spMkLst>
-        </pc:spChg>
-        <pc:spChg chg="mod">
-          <ac:chgData name="Marcia Moraes" userId="c9c67e8a-58e2-4733-9a1c-5d44fec4775b" providerId="ADAL" clId="{F9CDF985-13F2-499A-8A55-943F22618C3C}" dt="2023-09-26T21:21:37.362" v="6005" actId="962"/>
-          <ac:spMkLst>
-            <pc:docMk/>
-            <pc:sldMk cId="2926028301" sldId="275"/>
-            <ac:spMk id="10" creationId="{919C5E24-3952-461C-9BD5-A6E7E8A2631D}"/>
-          </ac:spMkLst>
-        </pc:spChg>
-        <pc:picChg chg="mod">
-          <ac:chgData name="Marcia Moraes" userId="c9c67e8a-58e2-4733-9a1c-5d44fec4775b" providerId="ADAL" clId="{F9CDF985-13F2-499A-8A55-943F22618C3C}" dt="2023-09-26T21:21:10.200" v="6001" actId="962"/>
-          <ac:picMkLst>
-            <pc:docMk/>
-            <pc:sldMk cId="2926028301" sldId="275"/>
-            <ac:picMk id="4" creationId="{945CAD51-4638-4142-B0EF-8F0CA1129911}"/>
-          </ac:picMkLst>
-        </pc:picChg>
-      </pc:sldChg>
-      <pc:sldChg chg="modSp add ord">
-        <pc:chgData name="Marcia Moraes" userId="c9c67e8a-58e2-4733-9a1c-5d44fec4775b" providerId="ADAL" clId="{F9CDF985-13F2-499A-8A55-943F22618C3C}" dt="2023-09-26T19:56:05.441" v="2441" actId="1076"/>
-        <pc:sldMkLst>
-          <pc:docMk/>
-          <pc:sldMk cId="1405257276" sldId="276"/>
-        </pc:sldMkLst>
-        <pc:spChg chg="mod">
-          <ac:chgData name="Marcia Moraes" userId="c9c67e8a-58e2-4733-9a1c-5d44fec4775b" providerId="ADAL" clId="{F9CDF985-13F2-499A-8A55-943F22618C3C}" dt="2023-09-26T19:55:33.393" v="2375" actId="1076"/>
-          <ac:spMkLst>
-            <pc:docMk/>
-            <pc:sldMk cId="1405257276" sldId="276"/>
-            <ac:spMk id="4" creationId="{D6148A1E-4BB9-3E41-9954-7E0FE5CDE376}"/>
-          </ac:spMkLst>
-        </pc:spChg>
-        <pc:spChg chg="mod">
-          <ac:chgData name="Marcia Moraes" userId="c9c67e8a-58e2-4733-9a1c-5d44fec4775b" providerId="ADAL" clId="{F9CDF985-13F2-499A-8A55-943F22618C3C}" dt="2023-09-26T19:56:05.441" v="2441" actId="1076"/>
-          <ac:spMkLst>
-            <pc:docMk/>
-            <pc:sldMk cId="1405257276" sldId="276"/>
-            <ac:spMk id="5" creationId="{60370ACD-6E3D-5D4E-8918-7EDF38D2E5B4}"/>
-          </ac:spMkLst>
-        </pc:spChg>
-      </pc:sldChg>
-      <pc:sldChg chg="addSp modSp add del">
-        <pc:chgData name="Marcia Moraes" userId="c9c67e8a-58e2-4733-9a1c-5d44fec4775b" providerId="ADAL" clId="{F9CDF985-13F2-499A-8A55-943F22618C3C}" dt="2023-09-26T21:26:22.381" v="6061" actId="2696"/>
-        <pc:sldMkLst>
-          <pc:docMk/>
-          <pc:sldMk cId="1444633711" sldId="277"/>
-        </pc:sldMkLst>
-        <pc:spChg chg="mod">
-          <ac:chgData name="Marcia Moraes" userId="c9c67e8a-58e2-4733-9a1c-5d44fec4775b" providerId="ADAL" clId="{F9CDF985-13F2-499A-8A55-943F22618C3C}" dt="2023-09-26T21:25:28.926" v="6053" actId="20577"/>
-          <ac:spMkLst>
-            <pc:docMk/>
-            <pc:sldMk cId="1444633711" sldId="277"/>
-            <ac:spMk id="2" creationId="{1083A153-D7DE-4C98-8D4A-D5139C33A5C7}"/>
-          </ac:spMkLst>
-        </pc:spChg>
-        <pc:spChg chg="add mod">
-          <ac:chgData name="Marcia Moraes" userId="c9c67e8a-58e2-4733-9a1c-5d44fec4775b" providerId="ADAL" clId="{F9CDF985-13F2-499A-8A55-943F22618C3C}" dt="2023-09-26T21:26:19.449" v="6060" actId="6549"/>
-          <ac:spMkLst>
-            <pc:docMk/>
-            <pc:sldMk cId="1444633711" sldId="277"/>
-            <ac:spMk id="4" creationId="{850A2EFA-10F0-499F-800F-B6F39231FE0E}"/>
-          </ac:spMkLst>
-        </pc:spChg>
-      </pc:sldChg>
-      <pc:sldChg chg="addSp modSp add del">
-        <pc:chgData name="Marcia Moraes" userId="c9c67e8a-58e2-4733-9a1c-5d44fec4775b" providerId="ADAL" clId="{F9CDF985-13F2-499A-8A55-943F22618C3C}" dt="2023-09-26T21:26:16.422" v="6058" actId="2696"/>
-        <pc:sldMkLst>
-          <pc:docMk/>
-          <pc:sldMk cId="507860403" sldId="278"/>
-        </pc:sldMkLst>
-        <pc:spChg chg="add mod">
-          <ac:chgData name="Marcia Moraes" userId="c9c67e8a-58e2-4733-9a1c-5d44fec4775b" providerId="ADAL" clId="{F9CDF985-13F2-499A-8A55-943F22618C3C}" dt="2023-09-26T21:25:48.862" v="6057"/>
-          <ac:spMkLst>
-            <pc:docMk/>
-            <pc:sldMk cId="507860403" sldId="278"/>
-            <ac:spMk id="5" creationId="{F853453B-A6E1-465D-906E-9152A769492A}"/>
-          </ac:spMkLst>
-        </pc:spChg>
       </pc:sldChg>
     </pc:docChg>
-  </pc:docChgLst>
-  <pc:docChgLst>
-    <pc:chgData name="Marcia Moraes" userId="c9c67e8a-58e2-4733-9a1c-5d44fec4775b" providerId="ADAL" clId="{EA7127AE-31EC-4AFB-91C6-2A0169B62BE0}"/>
   </pc:docChgLst>
 </pc:chgInfo>
 </file>
@@ -1303,7 +265,7 @@
           <a:p>
             <a:fld id="{4D7E51A5-B478-1E40-8CBB-0DAA8831E99D}" type="datetimeFigureOut">
               <a:rPr lang="en-US" smtClean="0"/>
-              <a:t>9/26/2023</a:t>
+              <a:t>2/16/2024</a:t>
             </a:fld>
             <a:endParaRPr lang="en-US"/>
           </a:p>
@@ -1468,7 +430,7 @@
           <a:p>
             <a:fld id="{D0ED587F-861E-6740-9643-E3DDAE89B8D6}" type="datetimeFigureOut">
               <a:rPr lang="en-US" smtClean="0"/>
-              <a:t>9/26/2023</a:t>
+              <a:t>2/16/2024</a:t>
             </a:fld>
             <a:endParaRPr lang="en-US"/>
           </a:p>
@@ -13582,7 +12544,7 @@
           <p:nvPr>
             <p:extLst>
               <p:ext uri="{D42A27DB-BD31-4B8C-83A1-F6EECF244321}">
-                <p14:modId xmlns:p14="http://schemas.microsoft.com/office/powerpoint/2010/main" val="1689762159"/>
+                <p14:modId xmlns:p14="http://schemas.microsoft.com/office/powerpoint/2010/main" val="2158135031"/>
               </p:ext>
             </p:extLst>
           </p:nvPr>
@@ -13890,10 +12852,28 @@
                         </a:spcAft>
                       </a:pPr>
                       <a:r>
+                        <a:rPr lang="en-US" sz="1600">
+                          <a:effectLst/>
+                        </a:rPr>
+                        <a:t>3 </a:t>
+                      </a:r>
+                      <a:r>
                         <a:rPr lang="en-US" sz="1600" dirty="0">
                           <a:effectLst/>
                         </a:rPr>
-                        <a:t>12 PM - 2 PM : CSB 120</a:t>
+                        <a:t>PM </a:t>
+                      </a:r>
+                      <a:r>
+                        <a:rPr lang="en-US" sz="1600">
+                          <a:effectLst/>
+                        </a:rPr>
+                        <a:t>- 5 </a:t>
+                      </a:r>
+                      <a:r>
+                        <a:rPr lang="en-US" sz="1600" dirty="0">
+                          <a:effectLst/>
+                        </a:rPr>
+                        <a:t>PM : CSB 120</a:t>
                       </a:r>
                       <a:endParaRPr lang="en-US" sz="1600" dirty="0">
                         <a:effectLst/>
@@ -25429,15 +24409,6 @@
 </file>
 
 <file path=customXml/item1.xml><?xml version="1.0" encoding="utf-8"?>
-<?mso-contentType ?>
-<FormTemplates xmlns="http://schemas.microsoft.com/sharepoint/v3/contenttype/forms">
-  <Display>DocumentLibraryForm</Display>
-  <Edit>DocumentLibraryForm</Edit>
-  <New>DocumentLibraryForm</New>
-</FormTemplates>
-</file>
-
-<file path=customXml/item2.xml><?xml version="1.0" encoding="utf-8"?>
 <ct:contentTypeSchema xmlns:ct="http://schemas.microsoft.com/office/2006/metadata/contentType" xmlns:ma="http://schemas.microsoft.com/office/2006/metadata/properties/metaAttributes" ct:_="" ma:_="" ma:contentTypeName="Document" ma:contentTypeID="0x010100074387D78AC76C4289401EF66FB51FCC" ma:contentTypeVersion="15" ma:contentTypeDescription="Create a new document." ma:contentTypeScope="" ma:versionID="d3659bec8b8330148a03d82a9d99f412">
   <xsd:schema xmlns:xsd="http://www.w3.org/2001/XMLSchema" xmlns:xs="http://www.w3.org/2001/XMLSchema" xmlns:p="http://schemas.microsoft.com/office/2006/metadata/properties" xmlns:ns3="92c41bee-f0ee-4aa6-9399-a35fbb883510" xmlns:ns4="e06ed288-fd75-4b50-bbed-f5a5df88c31c" targetNamespace="http://schemas.microsoft.com/office/2006/metadata/properties" ma:root="true" ma:fieldsID="1a21d371127b63848c9a2290f5945250" ns3:_="" ns4:_="">
     <xsd:import namespace="92c41bee-f0ee-4aa6-9399-a35fbb883510"/>
@@ -25672,6 +24643,15 @@
 </ct:contentTypeSchema>
 </file>
 
+<file path=customXml/item2.xml><?xml version="1.0" encoding="utf-8"?>
+<?mso-contentType ?>
+<FormTemplates xmlns="http://schemas.microsoft.com/sharepoint/v3/contenttype/forms">
+  <Display>DocumentLibraryForm</Display>
+  <Edit>DocumentLibraryForm</Edit>
+  <New>DocumentLibraryForm</New>
+</FormTemplates>
+</file>
+
 <file path=customXml/item3.xml><?xml version="1.0" encoding="utf-8"?>
 <p:properties xmlns:p="http://schemas.microsoft.com/office/2006/metadata/properties" xmlns:xsi="http://www.w3.org/2001/XMLSchema-instance" xmlns:pc="http://schemas.microsoft.com/office/infopath/2007/PartnerControls">
   <documentManagement>
@@ -25681,14 +24661,6 @@
 </file>
 
 <file path=customXml/itemProps1.xml><?xml version="1.0" encoding="utf-8"?>
-<ds:datastoreItem xmlns:ds="http://schemas.openxmlformats.org/officeDocument/2006/customXml" ds:itemID="{22102A9F-045A-4750-A220-48D737455AFB}">
-  <ds:schemaRefs>
-    <ds:schemaRef ds:uri="http://schemas.microsoft.com/sharepoint/v3/contenttype/forms"/>
-  </ds:schemaRefs>
-</ds:datastoreItem>
-</file>
-
-<file path=customXml/itemProps2.xml><?xml version="1.0" encoding="utf-8"?>
 <ds:datastoreItem xmlns:ds="http://schemas.openxmlformats.org/officeDocument/2006/customXml" ds:itemID="{450DD271-6848-486E-8635-15D65EA21C14}">
   <ds:schemaRefs>
     <ds:schemaRef ds:uri="http://schemas.microsoft.com/office/2006/metadata/contentType"/>
@@ -25707,18 +24679,26 @@
 </ds:datastoreItem>
 </file>
 
+<file path=customXml/itemProps2.xml><?xml version="1.0" encoding="utf-8"?>
+<ds:datastoreItem xmlns:ds="http://schemas.openxmlformats.org/officeDocument/2006/customXml" ds:itemID="{22102A9F-045A-4750-A220-48D737455AFB}">
+  <ds:schemaRefs>
+    <ds:schemaRef ds:uri="http://schemas.microsoft.com/sharepoint/v3/contenttype/forms"/>
+  </ds:schemaRefs>
+</ds:datastoreItem>
+</file>
+
 <file path=customXml/itemProps3.xml><?xml version="1.0" encoding="utf-8"?>
 <ds:datastoreItem xmlns:ds="http://schemas.openxmlformats.org/officeDocument/2006/customXml" ds:itemID="{79148DBB-E3F1-4A84-AF7D-28B80FBFDF09}">
   <ds:schemaRefs>
-    <ds:schemaRef ds:uri="http://schemas.openxmlformats.org/package/2006/metadata/core-properties"/>
+    <ds:schemaRef ds:uri="http://schemas.microsoft.com/office/infopath/2007/PartnerControls"/>
+    <ds:schemaRef ds:uri="http://purl.org/dc/terms/"/>
+    <ds:schemaRef ds:uri="http://purl.org/dc/elements/1.1/"/>
+    <ds:schemaRef ds:uri="http://schemas.microsoft.com/office/2006/documentManagement/types"/>
     <ds:schemaRef ds:uri="e06ed288-fd75-4b50-bbed-f5a5df88c31c"/>
-    <ds:schemaRef ds:uri="http://schemas.microsoft.com/office/2006/documentManagement/types"/>
     <ds:schemaRef ds:uri="http://www.w3.org/XML/1998/namespace"/>
     <ds:schemaRef ds:uri="http://schemas.microsoft.com/office/2006/metadata/properties"/>
+    <ds:schemaRef ds:uri="http://schemas.openxmlformats.org/package/2006/metadata/core-properties"/>
     <ds:schemaRef ds:uri="92c41bee-f0ee-4aa6-9399-a35fbb883510"/>
-    <ds:schemaRef ds:uri="http://purl.org/dc/terms/"/>
-    <ds:schemaRef ds:uri="http://purl.org/dc/elements/1.1/"/>
-    <ds:schemaRef ds:uri="http://schemas.microsoft.com/office/infopath/2007/PartnerControls"/>
     <ds:schemaRef ds:uri="http://purl.org/dc/dcmitype/"/>
   </ds:schemaRefs>
 </ds:datastoreItem>

</xml_diff>